<commit_message>
Se ha documentado correctamente el código. Se ha agregado un Readme adecuado.
</commit_message>
<xml_diff>
--- a/Rental_predictor.pptx
+++ b/Rental_predictor.pptx
@@ -5,14 +5,14 @@
     <p:sldMasterId id="2147483648" r:id="rId1"/>
   </p:sldMasterIdLst>
   <p:notesMasterIdLst>
-    <p:notesMasterId r:id="rId16"/>
+    <p:notesMasterId r:id="rId17"/>
   </p:notesMasterIdLst>
   <p:sldIdLst>
     <p:sldId id="256" r:id="rId2"/>
     <p:sldId id="257" r:id="rId3"/>
     <p:sldId id="258" r:id="rId4"/>
-    <p:sldId id="259" r:id="rId5"/>
-    <p:sldId id="260" r:id="rId6"/>
+    <p:sldId id="260" r:id="rId5"/>
+    <p:sldId id="259" r:id="rId6"/>
     <p:sldId id="261" r:id="rId7"/>
     <p:sldId id="262" r:id="rId8"/>
     <p:sldId id="263" r:id="rId9"/>
@@ -22,6 +22,7 @@
     <p:sldId id="267" r:id="rId13"/>
     <p:sldId id="269" r:id="rId14"/>
     <p:sldId id="268" r:id="rId15"/>
+    <p:sldId id="270" r:id="rId16"/>
   </p:sldIdLst>
   <p:sldSz cx="12192000" cy="6858000"/>
   <p:notesSz cx="6858000" cy="9144000"/>
@@ -221,7 +222,7 @@
           <a:p>
             <a:fld id="{4BEDB2C5-8B65-4D40-8CB1-CA09986A714E}" type="datetimeFigureOut">
               <a:rPr lang="es-ES" smtClean="0"/>
-              <a:t>20/7/23</a:t>
+              <a:t>22/7/23</a:t>
             </a:fld>
             <a:endParaRPr lang="es-ES"/>
           </a:p>
@@ -719,7 +720,7 @@
           <a:p>
             <a:fld id="{7DA56E33-A1BC-B240-938B-86E0E5A5E6E3}" type="datetimeFigureOut">
               <a:rPr lang="es-ES" smtClean="0"/>
-              <a:t>20/7/23</a:t>
+              <a:t>22/7/23</a:t>
             </a:fld>
             <a:endParaRPr lang="es-ES"/>
           </a:p>
@@ -917,7 +918,7 @@
           <a:p>
             <a:fld id="{7DA56E33-A1BC-B240-938B-86E0E5A5E6E3}" type="datetimeFigureOut">
               <a:rPr lang="es-ES" smtClean="0"/>
-              <a:t>20/7/23</a:t>
+              <a:t>22/7/23</a:t>
             </a:fld>
             <a:endParaRPr lang="es-ES"/>
           </a:p>
@@ -1125,7 +1126,7 @@
           <a:p>
             <a:fld id="{7DA56E33-A1BC-B240-938B-86E0E5A5E6E3}" type="datetimeFigureOut">
               <a:rPr lang="es-ES" smtClean="0"/>
-              <a:t>20/7/23</a:t>
+              <a:t>22/7/23</a:t>
             </a:fld>
             <a:endParaRPr lang="es-ES"/>
           </a:p>
@@ -1323,7 +1324,7 @@
           <a:p>
             <a:fld id="{7DA56E33-A1BC-B240-938B-86E0E5A5E6E3}" type="datetimeFigureOut">
               <a:rPr lang="es-ES" smtClean="0"/>
-              <a:t>20/7/23</a:t>
+              <a:t>22/7/23</a:t>
             </a:fld>
             <a:endParaRPr lang="es-ES"/>
           </a:p>
@@ -1598,7 +1599,7 @@
           <a:p>
             <a:fld id="{7DA56E33-A1BC-B240-938B-86E0E5A5E6E3}" type="datetimeFigureOut">
               <a:rPr lang="es-ES" smtClean="0"/>
-              <a:t>20/7/23</a:t>
+              <a:t>22/7/23</a:t>
             </a:fld>
             <a:endParaRPr lang="es-ES"/>
           </a:p>
@@ -1863,7 +1864,7 @@
           <a:p>
             <a:fld id="{7DA56E33-A1BC-B240-938B-86E0E5A5E6E3}" type="datetimeFigureOut">
               <a:rPr lang="es-ES" smtClean="0"/>
-              <a:t>20/7/23</a:t>
+              <a:t>22/7/23</a:t>
             </a:fld>
             <a:endParaRPr lang="es-ES"/>
           </a:p>
@@ -2275,7 +2276,7 @@
           <a:p>
             <a:fld id="{7DA56E33-A1BC-B240-938B-86E0E5A5E6E3}" type="datetimeFigureOut">
               <a:rPr lang="es-ES" smtClean="0"/>
-              <a:t>20/7/23</a:t>
+              <a:t>22/7/23</a:t>
             </a:fld>
             <a:endParaRPr lang="es-ES"/>
           </a:p>
@@ -2416,7 +2417,7 @@
           <a:p>
             <a:fld id="{7DA56E33-A1BC-B240-938B-86E0E5A5E6E3}" type="datetimeFigureOut">
               <a:rPr lang="es-ES" smtClean="0"/>
-              <a:t>20/7/23</a:t>
+              <a:t>22/7/23</a:t>
             </a:fld>
             <a:endParaRPr lang="es-ES"/>
           </a:p>
@@ -2529,7 +2530,7 @@
           <a:p>
             <a:fld id="{7DA56E33-A1BC-B240-938B-86E0E5A5E6E3}" type="datetimeFigureOut">
               <a:rPr lang="es-ES" smtClean="0"/>
-              <a:t>20/7/23</a:t>
+              <a:t>22/7/23</a:t>
             </a:fld>
             <a:endParaRPr lang="es-ES"/>
           </a:p>
@@ -2840,7 +2841,7 @@
           <a:p>
             <a:fld id="{7DA56E33-A1BC-B240-938B-86E0E5A5E6E3}" type="datetimeFigureOut">
               <a:rPr lang="es-ES" smtClean="0"/>
-              <a:t>20/7/23</a:t>
+              <a:t>22/7/23</a:t>
             </a:fld>
             <a:endParaRPr lang="es-ES"/>
           </a:p>
@@ -3128,7 +3129,7 @@
           <a:p>
             <a:fld id="{7DA56E33-A1BC-B240-938B-86E0E5A5E6E3}" type="datetimeFigureOut">
               <a:rPr lang="es-ES" smtClean="0"/>
-              <a:t>20/7/23</a:t>
+              <a:t>22/7/23</a:t>
             </a:fld>
             <a:endParaRPr lang="es-ES"/>
           </a:p>
@@ -3369,7 +3370,7 @@
           <a:p>
             <a:fld id="{7DA56E33-A1BC-B240-938B-86E0E5A5E6E3}" type="datetimeFigureOut">
               <a:rPr lang="es-ES" smtClean="0"/>
-              <a:t>20/7/23</a:t>
+              <a:t>22/7/23</a:t>
             </a:fld>
             <a:endParaRPr lang="es-ES"/>
           </a:p>
@@ -4177,7 +4178,7 @@
         </p:nvSpPr>
         <p:spPr>
           <a:xfrm>
-            <a:off x="0" y="0"/>
+            <a:off x="0" y="21100"/>
             <a:ext cx="12192000" cy="6858000"/>
           </a:xfrm>
           <a:prstGeom prst="rect">
@@ -6333,6 +6334,276 @@
 </p:sld>
 </file>
 
+<file path=ppt/slides/slide15.xml><?xml version="1.0" encoding="utf-8"?>
+<p:sld xmlns:a="http://schemas.openxmlformats.org/drawingml/2006/main" xmlns:r="http://schemas.openxmlformats.org/officeDocument/2006/relationships" xmlns:p="http://schemas.openxmlformats.org/presentationml/2006/main">
+  <p:cSld>
+    <p:spTree>
+      <p:nvGrpSpPr>
+        <p:cNvPr id="1" name=""/>
+        <p:cNvGrpSpPr/>
+        <p:nvPr/>
+      </p:nvGrpSpPr>
+      <p:grpSpPr>
+        <a:xfrm>
+          <a:off x="0" y="0"/>
+          <a:ext cx="0" cy="0"/>
+          <a:chOff x="0" y="0"/>
+          <a:chExt cx="0" cy="0"/>
+        </a:xfrm>
+      </p:grpSpPr>
+      <p:sp>
+        <p:nvSpPr>
+          <p:cNvPr id="5" name="Rectángulo 4">
+            <a:extLst>
+              <a:ext uri="{FF2B5EF4-FFF2-40B4-BE49-F238E27FC236}">
+                <a16:creationId xmlns:a16="http://schemas.microsoft.com/office/drawing/2014/main" id="{F9FA76F6-CE9F-B094-E41B-8B9EC7F0D26E}"/>
+              </a:ext>
+            </a:extLst>
+          </p:cNvPr>
+          <p:cNvSpPr/>
+          <p:nvPr/>
+        </p:nvSpPr>
+        <p:spPr>
+          <a:xfrm>
+            <a:off x="0" y="0"/>
+            <a:ext cx="12192000" cy="6858000"/>
+          </a:xfrm>
+          <a:prstGeom prst="rect">
+            <a:avLst/>
+          </a:prstGeom>
+          <a:solidFill>
+            <a:srgbClr val="54838D"/>
+          </a:solidFill>
+          <a:ln>
+            <a:noFill/>
+          </a:ln>
+        </p:spPr>
+        <p:style>
+          <a:lnRef idx="2">
+            <a:schemeClr val="accent1">
+              <a:shade val="15000"/>
+            </a:schemeClr>
+          </a:lnRef>
+          <a:fillRef idx="1">
+            <a:schemeClr val="accent1"/>
+          </a:fillRef>
+          <a:effectRef idx="0">
+            <a:schemeClr val="accent1"/>
+          </a:effectRef>
+          <a:fontRef idx="minor">
+            <a:schemeClr val="lt1"/>
+          </a:fontRef>
+        </p:style>
+        <p:txBody>
+          <a:bodyPr rtlCol="0" anchor="ctr"/>
+          <a:lstStyle/>
+          <a:p>
+            <a:pPr marL="0" algn="ctr" rtl="0" eaLnBrk="1" fontAlgn="t" latinLnBrk="0" hangingPunct="1">
+              <a:spcBef>
+                <a:spcPts val="0"/>
+              </a:spcBef>
+              <a:spcAft>
+                <a:spcPts val="0"/>
+              </a:spcAft>
+            </a:pPr>
+            <a:endParaRPr lang="es-ES" sz="1800" b="0" i="0" u="none" strike="noStrike" dirty="0">
+              <a:effectLst/>
+              <a:latin typeface="Arial" panose="020B0604020202020204" pitchFamily="34" charset="0"/>
+            </a:endParaRPr>
+          </a:p>
+        </p:txBody>
+      </p:sp>
+      <p:sp>
+        <p:nvSpPr>
+          <p:cNvPr id="7" name="Rectángulo redondeado 6">
+            <a:extLst>
+              <a:ext uri="{FF2B5EF4-FFF2-40B4-BE49-F238E27FC236}">
+                <a16:creationId xmlns:a16="http://schemas.microsoft.com/office/drawing/2014/main" id="{E0332278-6626-D722-5837-CCB375A25B98}"/>
+              </a:ext>
+            </a:extLst>
+          </p:cNvPr>
+          <p:cNvSpPr/>
+          <p:nvPr/>
+        </p:nvSpPr>
+        <p:spPr>
+          <a:xfrm>
+            <a:off x="954157" y="182880"/>
+            <a:ext cx="10336695" cy="6503670"/>
+          </a:xfrm>
+          <a:prstGeom prst="roundRect">
+            <a:avLst/>
+          </a:prstGeom>
+          <a:solidFill>
+            <a:schemeClr val="bg1">
+              <a:alpha val="87000"/>
+            </a:schemeClr>
+          </a:solidFill>
+          <a:ln>
+            <a:noFill/>
+          </a:ln>
+        </p:spPr>
+        <p:style>
+          <a:lnRef idx="2">
+            <a:schemeClr val="accent1">
+              <a:shade val="15000"/>
+            </a:schemeClr>
+          </a:lnRef>
+          <a:fillRef idx="1">
+            <a:schemeClr val="accent1"/>
+          </a:fillRef>
+          <a:effectRef idx="0">
+            <a:schemeClr val="accent1"/>
+          </a:effectRef>
+          <a:fontRef idx="minor">
+            <a:schemeClr val="lt1"/>
+          </a:fontRef>
+        </p:style>
+        <p:txBody>
+          <a:bodyPr rtlCol="0" anchor="ctr"/>
+          <a:lstStyle/>
+          <a:p>
+            <a:endParaRPr lang="es-ES" sz="6000" dirty="0">
+              <a:solidFill>
+                <a:schemeClr val="tx1"/>
+              </a:solidFill>
+            </a:endParaRPr>
+          </a:p>
+        </p:txBody>
+      </p:sp>
+      <p:sp>
+        <p:nvSpPr>
+          <p:cNvPr id="2" name="CuadroTexto 1">
+            <a:extLst>
+              <a:ext uri="{FF2B5EF4-FFF2-40B4-BE49-F238E27FC236}">
+                <a16:creationId xmlns:a16="http://schemas.microsoft.com/office/drawing/2014/main" id="{3B9ACF58-757D-950E-EEB0-3848AFE5C87A}"/>
+              </a:ext>
+            </a:extLst>
+          </p:cNvPr>
+          <p:cNvSpPr txBox="1"/>
+          <p:nvPr/>
+        </p:nvSpPr>
+        <p:spPr>
+          <a:xfrm>
+            <a:off x="1563756" y="848139"/>
+            <a:ext cx="9674087" cy="4462760"/>
+          </a:xfrm>
+          <a:prstGeom prst="rect">
+            <a:avLst/>
+          </a:prstGeom>
+          <a:noFill/>
+        </p:spPr>
+        <p:txBody>
+          <a:bodyPr wrap="square" rtlCol="0">
+            <a:spAutoFit/>
+          </a:bodyPr>
+          <a:lstStyle/>
+          <a:p>
+            <a:r>
+              <a:rPr lang="es-ES" sz="3200" b="1" dirty="0" err="1"/>
+              <a:t>Hiperparámetros</a:t>
+            </a:r>
+            <a:r>
+              <a:rPr lang="es-ES" sz="3200" b="1" dirty="0"/>
+              <a:t>:</a:t>
+            </a:r>
+          </a:p>
+          <a:p>
+            <a:endParaRPr lang="es-ES" sz="2800" b="1" dirty="0"/>
+          </a:p>
+          <a:p>
+            <a:endParaRPr lang="es-ES" sz="2800" b="1" dirty="0"/>
+          </a:p>
+          <a:p>
+            <a:pPr marL="742950" lvl="1" indent="-285750">
+              <a:buFont typeface="Arial" panose="020B0604020202020204" pitchFamily="34" charset="0"/>
+              <a:buChar char="•"/>
+            </a:pPr>
+            <a:r>
+              <a:rPr lang="es-ES" sz="2800" b="1" dirty="0" err="1"/>
+              <a:t>learning_rate</a:t>
+            </a:r>
+            <a:r>
+              <a:rPr lang="es-ES" sz="2800" b="1" dirty="0"/>
+              <a:t> (0.1): </a:t>
+            </a:r>
+            <a:r>
+              <a:rPr lang="es-ES" sz="2400" dirty="0"/>
+              <a:t>la importancia de cada árbol de  decisión</a:t>
+            </a:r>
+          </a:p>
+          <a:p>
+            <a:pPr lvl="1"/>
+            <a:endParaRPr lang="es-ES" sz="2800" dirty="0"/>
+          </a:p>
+          <a:p>
+            <a:pPr lvl="1"/>
+            <a:endParaRPr lang="es-ES" sz="2800" b="1" dirty="0"/>
+          </a:p>
+          <a:p>
+            <a:pPr marL="742950" lvl="1" indent="-285750">
+              <a:buFont typeface="Arial" panose="020B0604020202020204" pitchFamily="34" charset="0"/>
+              <a:buChar char="•"/>
+            </a:pPr>
+            <a:r>
+              <a:rPr lang="es-ES" sz="2800" b="1" dirty="0" err="1"/>
+              <a:t>max_depth</a:t>
+            </a:r>
+            <a:r>
+              <a:rPr lang="es-ES" sz="2800" b="1" dirty="0"/>
+              <a:t> (6): </a:t>
+            </a:r>
+            <a:r>
+              <a:rPr lang="es-ES" sz="2400" dirty="0"/>
+              <a:t>la profundidad de cada árbol de decisión</a:t>
+            </a:r>
+          </a:p>
+          <a:p>
+            <a:pPr marL="742950" lvl="1" indent="-285750">
+              <a:buFont typeface="Arial" panose="020B0604020202020204" pitchFamily="34" charset="0"/>
+              <a:buChar char="•"/>
+            </a:pPr>
+            <a:endParaRPr lang="es-ES" sz="2800" dirty="0"/>
+          </a:p>
+          <a:p>
+            <a:pPr marL="742950" lvl="1" indent="-285750">
+              <a:buFont typeface="Arial" panose="020B0604020202020204" pitchFamily="34" charset="0"/>
+              <a:buChar char="•"/>
+            </a:pPr>
+            <a:endParaRPr lang="es-ES" sz="2800" dirty="0"/>
+          </a:p>
+          <a:p>
+            <a:pPr marL="742950" lvl="1" indent="-285750">
+              <a:buFont typeface="Arial" panose="020B0604020202020204" pitchFamily="34" charset="0"/>
+              <a:buChar char="•"/>
+            </a:pPr>
+            <a:r>
+              <a:rPr lang="es-ES" sz="2800" b="1" dirty="0" err="1"/>
+              <a:t>n_estimators</a:t>
+            </a:r>
+            <a:r>
+              <a:rPr lang="es-ES" sz="2800" b="1" dirty="0"/>
+              <a:t> (71): </a:t>
+            </a:r>
+            <a:r>
+              <a:rPr lang="es-ES" sz="2400" dirty="0"/>
+              <a:t>cantidad de árboles de decisión</a:t>
+            </a:r>
+          </a:p>
+        </p:txBody>
+      </p:sp>
+    </p:spTree>
+    <p:extLst>
+      <p:ext uri="{BB962C8B-B14F-4D97-AF65-F5344CB8AC3E}">
+        <p14:creationId xmlns:p14="http://schemas.microsoft.com/office/powerpoint/2010/main" val="2189797229"/>
+      </p:ext>
+    </p:extLst>
+  </p:cSld>
+  <p:clrMapOvr>
+    <a:masterClrMapping/>
+  </p:clrMapOvr>
+</p:sld>
+</file>
+
 <file path=ppt/slides/slide2.xml><?xml version="1.0" encoding="utf-8"?>
 <p:sld xmlns:a="http://schemas.openxmlformats.org/drawingml/2006/main" xmlns:r="http://schemas.openxmlformats.org/officeDocument/2006/relationships" xmlns:p="http://schemas.openxmlformats.org/presentationml/2006/main">
   <p:cSld>
@@ -7009,1560 +7280,6 @@
                 <a:spcPts val="0"/>
               </a:spcAft>
             </a:pPr>
-            <a:r>
-              <a:rPr lang="es-ES" sz="1800" b="1" i="0" u="none" strike="noStrike" kern="1200">
-                <a:solidFill>
-                  <a:srgbClr val="FFFFFF"/>
-                </a:solidFill>
-                <a:effectLst/>
-                <a:latin typeface="Calibri" panose="020F0502020204030204" pitchFamily="34" charset="0"/>
-              </a:rPr>
-              <a:t>Features</a:t>
-            </a:r>
-            <a:endParaRPr lang="es-ES" sz="1800" b="0" i="0" u="none" strike="noStrike">
-              <a:effectLst/>
-              <a:latin typeface="Arial" panose="020B0604020202020204" pitchFamily="34" charset="0"/>
-            </a:endParaRPr>
-          </a:p>
-          <a:p>
-            <a:pPr marL="0" algn="ctr" rtl="0" eaLnBrk="1" fontAlgn="ctr" latinLnBrk="0" hangingPunct="1">
-              <a:spcBef>
-                <a:spcPts val="0"/>
-              </a:spcBef>
-              <a:spcAft>
-                <a:spcPts val="0"/>
-              </a:spcAft>
-            </a:pPr>
-            <a:r>
-              <a:rPr lang="es-ES" sz="1800" b="0" i="0" u="none" strike="noStrike" kern="1200">
-                <a:solidFill>
-                  <a:srgbClr val="000000"/>
-                </a:solidFill>
-                <a:effectLst/>
-                <a:latin typeface="Calibri" panose="020F0502020204030204" pitchFamily="34" charset="0"/>
-              </a:rPr>
-              <a:t>Codigo_provincia</a:t>
-            </a:r>
-            <a:endParaRPr lang="es-ES" sz="1800" b="0" i="0" u="none" strike="noStrike" dirty="0">
-              <a:effectLst/>
-              <a:latin typeface="Arial" panose="020B0604020202020204" pitchFamily="34" charset="0"/>
-            </a:endParaRPr>
-          </a:p>
-        </p:txBody>
-      </p:sp>
-      <p:sp>
-        <p:nvSpPr>
-          <p:cNvPr id="8" name="Rectángulo redondeado 7">
-            <a:extLst>
-              <a:ext uri="{FF2B5EF4-FFF2-40B4-BE49-F238E27FC236}">
-                <a16:creationId xmlns:a16="http://schemas.microsoft.com/office/drawing/2014/main" id="{A1B2B0D3-1ACE-917E-8149-298FC4BE514D}"/>
-              </a:ext>
-            </a:extLst>
-          </p:cNvPr>
-          <p:cNvSpPr/>
-          <p:nvPr/>
-        </p:nvSpPr>
-        <p:spPr>
-          <a:xfrm>
-            <a:off x="167195" y="200968"/>
-            <a:ext cx="8701232" cy="6224884"/>
-          </a:xfrm>
-          <a:prstGeom prst="roundRect">
-            <a:avLst/>
-          </a:prstGeom>
-          <a:solidFill>
-            <a:schemeClr val="bg1">
-              <a:alpha val="87000"/>
-            </a:schemeClr>
-          </a:solidFill>
-          <a:ln>
-            <a:noFill/>
-          </a:ln>
-        </p:spPr>
-        <p:style>
-          <a:lnRef idx="2">
-            <a:schemeClr val="accent1">
-              <a:shade val="15000"/>
-            </a:schemeClr>
-          </a:lnRef>
-          <a:fillRef idx="1">
-            <a:schemeClr val="accent1"/>
-          </a:fillRef>
-          <a:effectRef idx="0">
-            <a:schemeClr val="accent1"/>
-          </a:effectRef>
-          <a:fontRef idx="minor">
-            <a:schemeClr val="lt1"/>
-          </a:fontRef>
-        </p:style>
-        <p:txBody>
-          <a:bodyPr rtlCol="0" anchor="ctr"/>
-          <a:lstStyle/>
-          <a:p>
-            <a:pPr algn="ctr"/>
-            <a:endParaRPr lang="es-ES" sz="6000" dirty="0">
-              <a:solidFill>
-                <a:schemeClr val="tx1"/>
-              </a:solidFill>
-            </a:endParaRPr>
-          </a:p>
-        </p:txBody>
-      </p:sp>
-      <p:graphicFrame>
-        <p:nvGraphicFramePr>
-          <p:cNvPr id="2" name="Tabla 2">
-            <a:extLst>
-              <a:ext uri="{FF2B5EF4-FFF2-40B4-BE49-F238E27FC236}">
-                <a16:creationId xmlns:a16="http://schemas.microsoft.com/office/drawing/2014/main" id="{9FC3886B-511A-6CD1-D789-8BC687BBA5E8}"/>
-              </a:ext>
-            </a:extLst>
-          </p:cNvPr>
-          <p:cNvGraphicFramePr>
-            <a:graphicFrameLocks noGrp="1"/>
-          </p:cNvGraphicFramePr>
-          <p:nvPr>
-            <p:extLst>
-              <p:ext uri="{D42A27DB-BD31-4B8C-83A1-F6EECF244321}">
-                <p14:modId xmlns:p14="http://schemas.microsoft.com/office/powerpoint/2010/main" val="4049248958"/>
-              </p:ext>
-            </p:extLst>
-          </p:nvPr>
-        </p:nvGraphicFramePr>
-        <p:xfrm>
-          <a:off x="532010" y="747801"/>
-          <a:ext cx="3041040" cy="4081549"/>
-        </p:xfrm>
-        <a:graphic>
-          <a:graphicData uri="http://schemas.openxmlformats.org/drawingml/2006/table">
-            <a:tbl>
-              <a:tblPr firstRow="1" bandRow="1">
-                <a:tableStyleId>{9DCAF9ED-07DC-4A11-8D7F-57B35C25682E}</a:tableStyleId>
-              </a:tblPr>
-              <a:tblGrid>
-                <a:gridCol w="3041040">
-                  <a:extLst>
-                    <a:ext uri="{9D8B030D-6E8A-4147-A177-3AD203B41FA5}">
-                      <a16:colId xmlns:a16="http://schemas.microsoft.com/office/drawing/2014/main" val="65502804"/>
-                    </a:ext>
-                  </a:extLst>
-                </a:gridCol>
-              </a:tblGrid>
-              <a:tr h="398949">
-                <a:tc>
-                  <a:txBody>
-                    <a:bodyPr/>
-                    <a:lstStyle/>
-                    <a:p>
-                      <a:pPr algn="ctr"/>
-                      <a:r>
-                        <a:rPr lang="es-ES" sz="2000" dirty="0" err="1"/>
-                        <a:t>Features</a:t>
-                      </a:r>
-                      <a:endParaRPr lang="es-ES" sz="2000" dirty="0"/>
-                    </a:p>
-                  </a:txBody>
-                  <a:tcPr/>
-                </a:tc>
-                <a:extLst>
-                  <a:ext uri="{0D108BD9-81ED-4DB2-BD59-A6C34878D82A}">
-                    <a16:rowId xmlns:a16="http://schemas.microsoft.com/office/drawing/2014/main" val="3469306187"/>
-                  </a:ext>
-                </a:extLst>
-              </a:tr>
-              <a:tr h="460325">
-                <a:tc>
-                  <a:txBody>
-                    <a:bodyPr/>
-                    <a:lstStyle/>
-                    <a:p>
-                      <a:pPr algn="ctr"/>
-                      <a:r>
-                        <a:rPr lang="es-ES" sz="2000" dirty="0" err="1">
-                          <a:effectLst/>
-                        </a:rPr>
-                        <a:t>Codigo_provincia</a:t>
-                      </a:r>
-                      <a:endParaRPr lang="es-ES" sz="2000" dirty="0">
-                        <a:effectLst/>
-                      </a:endParaRPr>
-                    </a:p>
-                  </a:txBody>
-                  <a:tcPr marL="76200" marR="76200" marT="76200" marB="76200" anchor="ctr"/>
-                </a:tc>
-                <a:extLst>
-                  <a:ext uri="{0D108BD9-81ED-4DB2-BD59-A6C34878D82A}">
-                    <a16:rowId xmlns:a16="http://schemas.microsoft.com/office/drawing/2014/main" val="506371762"/>
-                  </a:ext>
-                </a:extLst>
-              </a:tr>
-              <a:tr h="460325">
-                <a:tc>
-                  <a:txBody>
-                    <a:bodyPr/>
-                    <a:lstStyle/>
-                    <a:p>
-                      <a:pPr algn="ctr"/>
-                      <a:r>
-                        <a:rPr lang="es-ES" sz="2000" dirty="0">
-                          <a:effectLst/>
-                        </a:rPr>
-                        <a:t>Provincia</a:t>
-                      </a:r>
-                    </a:p>
-                  </a:txBody>
-                  <a:tcPr marL="76200" marR="76200" marT="76200" marB="76200" anchor="ctr"/>
-                </a:tc>
-                <a:extLst>
-                  <a:ext uri="{0D108BD9-81ED-4DB2-BD59-A6C34878D82A}">
-                    <a16:rowId xmlns:a16="http://schemas.microsoft.com/office/drawing/2014/main" val="903368235"/>
-                  </a:ext>
-                </a:extLst>
-              </a:tr>
-              <a:tr h="460325">
-                <a:tc>
-                  <a:txBody>
-                    <a:bodyPr/>
-                    <a:lstStyle/>
-                    <a:p>
-                      <a:pPr algn="ctr"/>
-                      <a:r>
-                        <a:rPr lang="es-ES" sz="2000" dirty="0" err="1">
-                          <a:effectLst/>
-                        </a:rPr>
-                        <a:t>Codigo_municipio</a:t>
-                      </a:r>
-                      <a:endParaRPr lang="es-ES" sz="2000" dirty="0">
-                        <a:effectLst/>
-                      </a:endParaRPr>
-                    </a:p>
-                  </a:txBody>
-                  <a:tcPr marL="76200" marR="76200" marT="76200" marB="76200" anchor="ctr"/>
-                </a:tc>
-                <a:extLst>
-                  <a:ext uri="{0D108BD9-81ED-4DB2-BD59-A6C34878D82A}">
-                    <a16:rowId xmlns:a16="http://schemas.microsoft.com/office/drawing/2014/main" val="1155914460"/>
-                  </a:ext>
-                </a:extLst>
-              </a:tr>
-              <a:tr h="460325">
-                <a:tc>
-                  <a:txBody>
-                    <a:bodyPr/>
-                    <a:lstStyle/>
-                    <a:p>
-                      <a:pPr algn="ctr"/>
-                      <a:r>
-                        <a:rPr lang="es-ES" sz="2000" dirty="0" err="1">
-                          <a:effectLst/>
-                        </a:rPr>
-                        <a:t>Total_vc</a:t>
-                      </a:r>
-                      <a:endParaRPr lang="es-ES" sz="2000" dirty="0">
-                        <a:effectLst/>
-                      </a:endParaRPr>
-                    </a:p>
-                  </a:txBody>
-                  <a:tcPr marL="76200" marR="76200" marT="76200" marB="76200" anchor="ctr"/>
-                </a:tc>
-                <a:extLst>
-                  <a:ext uri="{0D108BD9-81ED-4DB2-BD59-A6C34878D82A}">
-                    <a16:rowId xmlns:a16="http://schemas.microsoft.com/office/drawing/2014/main" val="760467247"/>
-                  </a:ext>
-                </a:extLst>
-              </a:tr>
-              <a:tr h="460325">
-                <a:tc>
-                  <a:txBody>
-                    <a:bodyPr/>
-                    <a:lstStyle/>
-                    <a:p>
-                      <a:pPr algn="ctr"/>
-                      <a:r>
-                        <a:rPr lang="es-ES" sz="2000" dirty="0" err="1">
-                          <a:effectLst/>
-                        </a:rPr>
-                        <a:t>Total_vu</a:t>
-                      </a:r>
-                      <a:endParaRPr lang="es-ES" sz="2000" dirty="0">
-                        <a:effectLst/>
-                      </a:endParaRPr>
-                    </a:p>
-                  </a:txBody>
-                  <a:tcPr marL="76200" marR="76200" marT="76200" marB="76200" anchor="ctr"/>
-                </a:tc>
-                <a:extLst>
-                  <a:ext uri="{0D108BD9-81ED-4DB2-BD59-A6C34878D82A}">
-                    <a16:rowId xmlns:a16="http://schemas.microsoft.com/office/drawing/2014/main" val="535719876"/>
-                  </a:ext>
-                </a:extLst>
-              </a:tr>
-              <a:tr h="460325">
-                <a:tc>
-                  <a:txBody>
-                    <a:bodyPr/>
-                    <a:lstStyle/>
-                    <a:p>
-                      <a:pPr algn="ctr"/>
-                      <a:r>
-                        <a:rPr lang="es-ES" sz="2000" dirty="0">
-                          <a:effectLst/>
-                        </a:rPr>
-                        <a:t>Alquiler_mes_vc_m2</a:t>
-                      </a:r>
-                    </a:p>
-                  </a:txBody>
-                  <a:tcPr marL="76200" marR="76200" marT="76200" marB="76200" anchor="ctr"/>
-                </a:tc>
-                <a:extLst>
-                  <a:ext uri="{0D108BD9-81ED-4DB2-BD59-A6C34878D82A}">
-                    <a16:rowId xmlns:a16="http://schemas.microsoft.com/office/drawing/2014/main" val="3754357363"/>
-                  </a:ext>
-                </a:extLst>
-              </a:tr>
-              <a:tr h="460325">
-                <a:tc>
-                  <a:txBody>
-                    <a:bodyPr/>
-                    <a:lstStyle/>
-                    <a:p>
-                      <a:pPr algn="ctr"/>
-                      <a:r>
-                        <a:rPr lang="es-ES" sz="2000" dirty="0" err="1">
-                          <a:effectLst/>
-                        </a:rPr>
-                        <a:t>Comunidad_autonoma</a:t>
-                      </a:r>
-                      <a:endParaRPr lang="es-ES" sz="2000" dirty="0">
-                        <a:effectLst/>
-                      </a:endParaRPr>
-                    </a:p>
-                  </a:txBody>
-                  <a:tcPr marL="76200" marR="76200" marT="76200" marB="76200" anchor="ctr"/>
-                </a:tc>
-                <a:extLst>
-                  <a:ext uri="{0D108BD9-81ED-4DB2-BD59-A6C34878D82A}">
-                    <a16:rowId xmlns:a16="http://schemas.microsoft.com/office/drawing/2014/main" val="1462632079"/>
-                  </a:ext>
-                </a:extLst>
-              </a:tr>
-              <a:tr h="460325">
-                <a:tc>
-                  <a:txBody>
-                    <a:bodyPr/>
-                    <a:lstStyle/>
-                    <a:p>
-                      <a:pPr algn="ctr"/>
-                      <a:r>
-                        <a:rPr lang="es-ES" sz="2000" dirty="0" err="1">
-                          <a:effectLst/>
-                        </a:rPr>
-                        <a:t>Poblacion</a:t>
-                      </a:r>
-                      <a:endParaRPr lang="es-ES" sz="2000" dirty="0">
-                        <a:effectLst/>
-                      </a:endParaRPr>
-                    </a:p>
-                  </a:txBody>
-                  <a:tcPr marL="76200" marR="76200" marT="76200" marB="76200" anchor="ctr"/>
-                </a:tc>
-                <a:extLst>
-                  <a:ext uri="{0D108BD9-81ED-4DB2-BD59-A6C34878D82A}">
-                    <a16:rowId xmlns:a16="http://schemas.microsoft.com/office/drawing/2014/main" val="1911219257"/>
-                  </a:ext>
-                </a:extLst>
-              </a:tr>
-            </a:tbl>
-          </a:graphicData>
-        </a:graphic>
-      </p:graphicFrame>
-      <p:graphicFrame>
-        <p:nvGraphicFramePr>
-          <p:cNvPr id="3" name="Tabla 2">
-            <a:extLst>
-              <a:ext uri="{FF2B5EF4-FFF2-40B4-BE49-F238E27FC236}">
-                <a16:creationId xmlns:a16="http://schemas.microsoft.com/office/drawing/2014/main" id="{CFD4E3A8-09F5-4B4D-A5D3-C65E3519A2A5}"/>
-              </a:ext>
-            </a:extLst>
-          </p:cNvPr>
-          <p:cNvGraphicFramePr>
-            <a:graphicFrameLocks noGrp="1"/>
-          </p:cNvGraphicFramePr>
-          <p:nvPr>
-            <p:extLst>
-              <p:ext uri="{D42A27DB-BD31-4B8C-83A1-F6EECF244321}">
-                <p14:modId xmlns:p14="http://schemas.microsoft.com/office/powerpoint/2010/main" val="4290306905"/>
-              </p:ext>
-            </p:extLst>
-          </p:nvPr>
-        </p:nvGraphicFramePr>
-        <p:xfrm>
-          <a:off x="4105060" y="747803"/>
-          <a:ext cx="4341660" cy="4081552"/>
-        </p:xfrm>
-        <a:graphic>
-          <a:graphicData uri="http://schemas.openxmlformats.org/drawingml/2006/table">
-            <a:tbl>
-              <a:tblPr firstRow="1" bandRow="1">
-                <a:tableStyleId>{9DCAF9ED-07DC-4A11-8D7F-57B35C25682E}</a:tableStyleId>
-              </a:tblPr>
-              <a:tblGrid>
-                <a:gridCol w="4341660">
-                  <a:extLst>
-                    <a:ext uri="{9D8B030D-6E8A-4147-A177-3AD203B41FA5}">
-                      <a16:colId xmlns:a16="http://schemas.microsoft.com/office/drawing/2014/main" val="65502804"/>
-                    </a:ext>
-                  </a:extLst>
-                </a:gridCol>
-              </a:tblGrid>
-              <a:tr h="368531">
-                <a:tc>
-                  <a:txBody>
-                    <a:bodyPr/>
-                    <a:lstStyle/>
-                    <a:p>
-                      <a:pPr algn="ctr"/>
-                      <a:r>
-                        <a:rPr lang="es-ES" sz="2000" dirty="0" err="1"/>
-                        <a:t>Features</a:t>
-                      </a:r>
-                      <a:endParaRPr lang="es-ES" sz="2000" dirty="0"/>
-                    </a:p>
-                  </a:txBody>
-                  <a:tcPr/>
-                </a:tc>
-                <a:extLst>
-                  <a:ext uri="{0D108BD9-81ED-4DB2-BD59-A6C34878D82A}">
-                    <a16:rowId xmlns:a16="http://schemas.microsoft.com/office/drawing/2014/main" val="3469306187"/>
-                  </a:ext>
-                </a:extLst>
-              </a:tr>
-              <a:tr h="460664">
-                <a:tc>
-                  <a:txBody>
-                    <a:bodyPr/>
-                    <a:lstStyle/>
-                    <a:p>
-                      <a:pPr algn="ctr"/>
-                      <a:r>
-                        <a:rPr lang="es-ES" sz="2000" dirty="0" err="1">
-                          <a:effectLst/>
-                        </a:rPr>
-                        <a:t>Inmuebles_totales</a:t>
-                      </a:r>
-                      <a:endParaRPr lang="es-ES" sz="2000" dirty="0">
-                        <a:effectLst/>
-                      </a:endParaRPr>
-                    </a:p>
-                  </a:txBody>
-                  <a:tcPr marL="76200" marR="76200" marT="76200" marB="76200" anchor="ctr"/>
-                </a:tc>
-                <a:extLst>
-                  <a:ext uri="{0D108BD9-81ED-4DB2-BD59-A6C34878D82A}">
-                    <a16:rowId xmlns:a16="http://schemas.microsoft.com/office/drawing/2014/main" val="506371762"/>
-                  </a:ext>
-                </a:extLst>
-              </a:tr>
-              <a:tr h="460664">
-                <a:tc>
-                  <a:txBody>
-                    <a:bodyPr/>
-                    <a:lstStyle/>
-                    <a:p>
-                      <a:pPr algn="ctr"/>
-                      <a:r>
-                        <a:rPr lang="es-ES" sz="2000" dirty="0" err="1">
-                          <a:effectLst/>
-                        </a:rPr>
-                        <a:t>Viviendas_turisticas</a:t>
-                      </a:r>
-                      <a:endParaRPr lang="es-ES" sz="2000" dirty="0">
-                        <a:effectLst/>
-                      </a:endParaRPr>
-                    </a:p>
-                  </a:txBody>
-                  <a:tcPr marL="76200" marR="76200" marT="76200" marB="76200" anchor="ctr"/>
-                </a:tc>
-                <a:extLst>
-                  <a:ext uri="{0D108BD9-81ED-4DB2-BD59-A6C34878D82A}">
-                    <a16:rowId xmlns:a16="http://schemas.microsoft.com/office/drawing/2014/main" val="903368235"/>
-                  </a:ext>
-                </a:extLst>
-              </a:tr>
-              <a:tr h="460664">
-                <a:tc>
-                  <a:txBody>
-                    <a:bodyPr/>
-                    <a:lstStyle/>
-                    <a:p>
-                      <a:pPr algn="ctr"/>
-                      <a:r>
-                        <a:rPr lang="es-ES" sz="2000" dirty="0">
-                          <a:effectLst/>
-                        </a:rPr>
-                        <a:t>Turistas</a:t>
-                      </a:r>
-                    </a:p>
-                  </a:txBody>
-                  <a:tcPr marL="76200" marR="76200" marT="76200" marB="76200" anchor="ctr"/>
-                </a:tc>
-                <a:extLst>
-                  <a:ext uri="{0D108BD9-81ED-4DB2-BD59-A6C34878D82A}">
-                    <a16:rowId xmlns:a16="http://schemas.microsoft.com/office/drawing/2014/main" val="1155914460"/>
-                  </a:ext>
-                </a:extLst>
-              </a:tr>
-              <a:tr h="460664">
-                <a:tc>
-                  <a:txBody>
-                    <a:bodyPr/>
-                    <a:lstStyle/>
-                    <a:p>
-                      <a:pPr algn="ctr"/>
-                      <a:r>
-                        <a:rPr lang="es-ES" sz="2000" dirty="0" err="1">
-                          <a:effectLst/>
-                        </a:rPr>
-                        <a:t>Porcentaje_viviendas_turisticas</a:t>
-                      </a:r>
-                      <a:endParaRPr lang="es-ES" sz="2000" dirty="0">
-                        <a:effectLst/>
-                      </a:endParaRPr>
-                    </a:p>
-                  </a:txBody>
-                  <a:tcPr marL="76200" marR="76200" marT="76200" marB="76200" anchor="ctr"/>
-                </a:tc>
-                <a:extLst>
-                  <a:ext uri="{0D108BD9-81ED-4DB2-BD59-A6C34878D82A}">
-                    <a16:rowId xmlns:a16="http://schemas.microsoft.com/office/drawing/2014/main" val="760467247"/>
-                  </a:ext>
-                </a:extLst>
-              </a:tr>
-              <a:tr h="460664">
-                <a:tc>
-                  <a:txBody>
-                    <a:bodyPr/>
-                    <a:lstStyle/>
-                    <a:p>
-                      <a:pPr algn="ctr"/>
-                      <a:r>
-                        <a:rPr lang="es-ES" sz="2000" dirty="0" err="1">
-                          <a:effectLst/>
-                        </a:rPr>
-                        <a:t>Total_casas_alquiler</a:t>
-                      </a:r>
-                      <a:endParaRPr lang="es-ES" sz="2000" dirty="0">
-                        <a:effectLst/>
-                      </a:endParaRPr>
-                    </a:p>
-                  </a:txBody>
-                  <a:tcPr marL="76200" marR="76200" marT="76200" marB="76200" anchor="ctr"/>
-                </a:tc>
-                <a:extLst>
-                  <a:ext uri="{0D108BD9-81ED-4DB2-BD59-A6C34878D82A}">
-                    <a16:rowId xmlns:a16="http://schemas.microsoft.com/office/drawing/2014/main" val="535719876"/>
-                  </a:ext>
-                </a:extLst>
-              </a:tr>
-              <a:tr h="460664">
-                <a:tc>
-                  <a:txBody>
-                    <a:bodyPr/>
-                    <a:lstStyle/>
-                    <a:p>
-                      <a:pPr algn="ctr"/>
-                      <a:r>
-                        <a:rPr lang="es-ES" sz="2000" dirty="0" err="1">
-                          <a:effectLst/>
-                        </a:rPr>
-                        <a:t>Porcentaje_viviendas_alquiler</a:t>
-                      </a:r>
-                      <a:endParaRPr lang="es-ES" sz="2000" dirty="0">
-                        <a:effectLst/>
-                      </a:endParaRPr>
-                    </a:p>
-                  </a:txBody>
-                  <a:tcPr marL="76200" marR="76200" marT="76200" marB="76200" anchor="ctr"/>
-                </a:tc>
-                <a:extLst>
-                  <a:ext uri="{0D108BD9-81ED-4DB2-BD59-A6C34878D82A}">
-                    <a16:rowId xmlns:a16="http://schemas.microsoft.com/office/drawing/2014/main" val="3754357363"/>
-                  </a:ext>
-                </a:extLst>
-              </a:tr>
-              <a:tr h="460664">
-                <a:tc>
-                  <a:txBody>
-                    <a:bodyPr/>
-                    <a:lstStyle/>
-                    <a:p>
-                      <a:pPr algn="ctr"/>
-                      <a:r>
-                        <a:rPr lang="es-ES" sz="2000" dirty="0" err="1">
-                          <a:effectLst/>
-                        </a:rPr>
-                        <a:t>Porcentaje_vc_alquiler</a:t>
-                      </a:r>
-                      <a:endParaRPr lang="es-ES" sz="2000" dirty="0">
-                        <a:effectLst/>
-                      </a:endParaRPr>
-                    </a:p>
-                  </a:txBody>
-                  <a:tcPr marL="76200" marR="76200" marT="76200" marB="76200" anchor="ctr"/>
-                </a:tc>
-                <a:extLst>
-                  <a:ext uri="{0D108BD9-81ED-4DB2-BD59-A6C34878D82A}">
-                    <a16:rowId xmlns:a16="http://schemas.microsoft.com/office/drawing/2014/main" val="1462632079"/>
-                  </a:ext>
-                </a:extLst>
-              </a:tr>
-              <a:tr h="460664">
-                <a:tc>
-                  <a:txBody>
-                    <a:bodyPr/>
-                    <a:lstStyle/>
-                    <a:p>
-                      <a:pPr algn="ctr"/>
-                      <a:r>
-                        <a:rPr lang="es-ES" sz="2000" dirty="0" err="1">
-                          <a:effectLst/>
-                        </a:rPr>
-                        <a:t>Porcentaje_vu_alquiler</a:t>
-                      </a:r>
-                      <a:endParaRPr lang="es-ES" sz="2000" dirty="0">
-                        <a:effectLst/>
-                      </a:endParaRPr>
-                    </a:p>
-                  </a:txBody>
-                  <a:tcPr marL="76200" marR="76200" marT="76200" marB="76200" anchor="ctr"/>
-                </a:tc>
-                <a:extLst>
-                  <a:ext uri="{0D108BD9-81ED-4DB2-BD59-A6C34878D82A}">
-                    <a16:rowId xmlns:a16="http://schemas.microsoft.com/office/drawing/2014/main" val="1911219257"/>
-                  </a:ext>
-                </a:extLst>
-              </a:tr>
-            </a:tbl>
-          </a:graphicData>
-        </a:graphic>
-      </p:graphicFrame>
-      <p:graphicFrame>
-        <p:nvGraphicFramePr>
-          <p:cNvPr id="6" name="Tabla 2">
-            <a:extLst>
-              <a:ext uri="{FF2B5EF4-FFF2-40B4-BE49-F238E27FC236}">
-                <a16:creationId xmlns:a16="http://schemas.microsoft.com/office/drawing/2014/main" id="{D34ECB66-DA24-AC91-DEDE-E6DB9E0EC425}"/>
-              </a:ext>
-            </a:extLst>
-          </p:cNvPr>
-          <p:cNvGraphicFramePr>
-            <a:graphicFrameLocks noGrp="1"/>
-          </p:cNvGraphicFramePr>
-          <p:nvPr>
-            <p:extLst>
-              <p:ext uri="{D42A27DB-BD31-4B8C-83A1-F6EECF244321}">
-                <p14:modId xmlns:p14="http://schemas.microsoft.com/office/powerpoint/2010/main" val="1829420841"/>
-              </p:ext>
-            </p:extLst>
-          </p:nvPr>
-        </p:nvGraphicFramePr>
-        <p:xfrm>
-          <a:off x="2403259" y="5250923"/>
-          <a:ext cx="3041040" cy="859274"/>
-        </p:xfrm>
-        <a:graphic>
-          <a:graphicData uri="http://schemas.openxmlformats.org/drawingml/2006/table">
-            <a:tbl>
-              <a:tblPr firstRow="1" bandRow="1">
-                <a:tableStyleId>{9DCAF9ED-07DC-4A11-8D7F-57B35C25682E}</a:tableStyleId>
-              </a:tblPr>
-              <a:tblGrid>
-                <a:gridCol w="3041040">
-                  <a:extLst>
-                    <a:ext uri="{9D8B030D-6E8A-4147-A177-3AD203B41FA5}">
-                      <a16:colId xmlns:a16="http://schemas.microsoft.com/office/drawing/2014/main" val="65502804"/>
-                    </a:ext>
-                  </a:extLst>
-                </a:gridCol>
-              </a:tblGrid>
-              <a:tr h="398949">
-                <a:tc>
-                  <a:txBody>
-                    <a:bodyPr/>
-                    <a:lstStyle/>
-                    <a:p>
-                      <a:pPr algn="ctr"/>
-                      <a:r>
-                        <a:rPr lang="es-ES" sz="2000" dirty="0"/>
-                        <a:t>Target</a:t>
-                      </a:r>
-                    </a:p>
-                  </a:txBody>
-                  <a:tcPr/>
-                </a:tc>
-                <a:extLst>
-                  <a:ext uri="{0D108BD9-81ED-4DB2-BD59-A6C34878D82A}">
-                    <a16:rowId xmlns:a16="http://schemas.microsoft.com/office/drawing/2014/main" val="3469306187"/>
-                  </a:ext>
-                </a:extLst>
-              </a:tr>
-              <a:tr h="460325">
-                <a:tc>
-                  <a:txBody>
-                    <a:bodyPr/>
-                    <a:lstStyle/>
-                    <a:p>
-                      <a:pPr algn="ctr"/>
-                      <a:r>
-                        <a:rPr lang="es-ES" sz="2000" dirty="0">
-                          <a:effectLst/>
-                        </a:rPr>
-                        <a:t>Alquiler_mes_vu_m2</a:t>
-                      </a:r>
-                    </a:p>
-                  </a:txBody>
-                  <a:tcPr marL="76200" marR="76200" marT="76200" marB="76200" anchor="ctr"/>
-                </a:tc>
-                <a:extLst>
-                  <a:ext uri="{0D108BD9-81ED-4DB2-BD59-A6C34878D82A}">
-                    <a16:rowId xmlns:a16="http://schemas.microsoft.com/office/drawing/2014/main" val="506371762"/>
-                  </a:ext>
-                </a:extLst>
-              </a:tr>
-            </a:tbl>
-          </a:graphicData>
-        </a:graphic>
-      </p:graphicFrame>
-      <p:sp>
-        <p:nvSpPr>
-          <p:cNvPr id="17" name="Rectángulo redondeado 16">
-            <a:extLst>
-              <a:ext uri="{FF2B5EF4-FFF2-40B4-BE49-F238E27FC236}">
-                <a16:creationId xmlns:a16="http://schemas.microsoft.com/office/drawing/2014/main" id="{7A7060FB-D264-1A83-72AA-0C514C376878}"/>
-              </a:ext>
-            </a:extLst>
-          </p:cNvPr>
-          <p:cNvSpPr/>
-          <p:nvPr/>
-        </p:nvSpPr>
-        <p:spPr>
-          <a:xfrm>
-            <a:off x="9136783" y="1396935"/>
-            <a:ext cx="2786861" cy="1622110"/>
-          </a:xfrm>
-          <a:prstGeom prst="roundRect">
-            <a:avLst/>
-          </a:prstGeom>
-          <a:solidFill>
-            <a:schemeClr val="bg1">
-              <a:alpha val="87000"/>
-            </a:schemeClr>
-          </a:solidFill>
-          <a:ln>
-            <a:noFill/>
-          </a:ln>
-        </p:spPr>
-        <p:style>
-          <a:lnRef idx="2">
-            <a:schemeClr val="accent1">
-              <a:shade val="15000"/>
-            </a:schemeClr>
-          </a:lnRef>
-          <a:fillRef idx="1">
-            <a:schemeClr val="accent1"/>
-          </a:fillRef>
-          <a:effectRef idx="0">
-            <a:schemeClr val="accent1"/>
-          </a:effectRef>
-          <a:fontRef idx="minor">
-            <a:schemeClr val="lt1"/>
-          </a:fontRef>
-        </p:style>
-        <p:txBody>
-          <a:bodyPr rtlCol="0" anchor="ctr"/>
-          <a:lstStyle/>
-          <a:p>
-            <a:r>
-              <a:rPr lang="es-ES" sz="2800" u="sng" dirty="0">
-                <a:solidFill>
-                  <a:schemeClr val="tx1"/>
-                </a:solidFill>
-              </a:rPr>
-              <a:t>Instancias:</a:t>
-            </a:r>
-          </a:p>
-          <a:p>
-            <a:pPr algn="ctr"/>
-            <a:r>
-              <a:rPr lang="es-ES" sz="4000" dirty="0">
-                <a:solidFill>
-                  <a:schemeClr val="tx1"/>
-                </a:solidFill>
-              </a:rPr>
-              <a:t>2033</a:t>
-            </a:r>
-          </a:p>
-        </p:txBody>
-      </p:sp>
-      <p:sp>
-        <p:nvSpPr>
-          <p:cNvPr id="20" name="Rectángulo redondeado 19">
-            <a:extLst>
-              <a:ext uri="{FF2B5EF4-FFF2-40B4-BE49-F238E27FC236}">
-                <a16:creationId xmlns:a16="http://schemas.microsoft.com/office/drawing/2014/main" id="{1DF931E0-6EF8-D4FB-39A2-B8DFEA4A029A}"/>
-              </a:ext>
-            </a:extLst>
-          </p:cNvPr>
-          <p:cNvSpPr/>
-          <p:nvPr/>
-        </p:nvSpPr>
-        <p:spPr>
-          <a:xfrm>
-            <a:off x="9187060" y="4127467"/>
-            <a:ext cx="2786861" cy="1622110"/>
-          </a:xfrm>
-          <a:prstGeom prst="roundRect">
-            <a:avLst/>
-          </a:prstGeom>
-          <a:solidFill>
-            <a:schemeClr val="bg1">
-              <a:alpha val="87000"/>
-            </a:schemeClr>
-          </a:solidFill>
-          <a:ln>
-            <a:noFill/>
-          </a:ln>
-        </p:spPr>
-        <p:style>
-          <a:lnRef idx="2">
-            <a:schemeClr val="accent1">
-              <a:shade val="15000"/>
-            </a:schemeClr>
-          </a:lnRef>
-          <a:fillRef idx="1">
-            <a:schemeClr val="accent1"/>
-          </a:fillRef>
-          <a:effectRef idx="0">
-            <a:schemeClr val="accent1"/>
-          </a:effectRef>
-          <a:fontRef idx="minor">
-            <a:schemeClr val="lt1"/>
-          </a:fontRef>
-        </p:style>
-        <p:txBody>
-          <a:bodyPr rtlCol="0" anchor="ctr"/>
-          <a:lstStyle/>
-          <a:p>
-            <a:r>
-              <a:rPr lang="es-ES" sz="2800" u="sng" dirty="0">
-                <a:solidFill>
-                  <a:schemeClr val="tx1"/>
-                </a:solidFill>
-              </a:rPr>
-              <a:t>Año de datos:</a:t>
-            </a:r>
-          </a:p>
-          <a:p>
-            <a:pPr algn="ctr"/>
-            <a:r>
-              <a:rPr lang="es-ES" sz="4000" dirty="0">
-                <a:solidFill>
-                  <a:schemeClr val="tx1"/>
-                </a:solidFill>
-              </a:rPr>
-              <a:t>2021</a:t>
-            </a:r>
-          </a:p>
-        </p:txBody>
-      </p:sp>
-      <p:sp>
-        <p:nvSpPr>
-          <p:cNvPr id="4" name="Rectángulo 3">
-            <a:extLst>
-              <a:ext uri="{FF2B5EF4-FFF2-40B4-BE49-F238E27FC236}">
-                <a16:creationId xmlns:a16="http://schemas.microsoft.com/office/drawing/2014/main" id="{B14E8936-A948-547A-DB13-A75737AB41A9}"/>
-              </a:ext>
-            </a:extLst>
-          </p:cNvPr>
-          <p:cNvSpPr/>
-          <p:nvPr/>
-        </p:nvSpPr>
-        <p:spPr>
-          <a:xfrm>
-            <a:off x="532010" y="2981026"/>
-            <a:ext cx="3041040" cy="479751"/>
-          </a:xfrm>
-          <a:prstGeom prst="rect">
-            <a:avLst/>
-          </a:prstGeom>
-          <a:noFill/>
-          <a:ln w="38100">
-            <a:solidFill>
-              <a:schemeClr val="tx1"/>
-            </a:solidFill>
-          </a:ln>
-        </p:spPr>
-        <p:style>
-          <a:lnRef idx="2">
-            <a:schemeClr val="accent1">
-              <a:shade val="15000"/>
-            </a:schemeClr>
-          </a:lnRef>
-          <a:fillRef idx="1">
-            <a:schemeClr val="accent1"/>
-          </a:fillRef>
-          <a:effectRef idx="0">
-            <a:schemeClr val="accent1"/>
-          </a:effectRef>
-          <a:fontRef idx="minor">
-            <a:schemeClr val="lt1"/>
-          </a:fontRef>
-        </p:style>
-        <p:txBody>
-          <a:bodyPr rtlCol="0" anchor="ctr"/>
-          <a:lstStyle/>
-          <a:p>
-            <a:pPr algn="ctr"/>
-            <a:endParaRPr lang="es-ES"/>
-          </a:p>
-        </p:txBody>
-      </p:sp>
-      <p:sp>
-        <p:nvSpPr>
-          <p:cNvPr id="7" name="Rectángulo 6">
-            <a:extLst>
-              <a:ext uri="{FF2B5EF4-FFF2-40B4-BE49-F238E27FC236}">
-                <a16:creationId xmlns:a16="http://schemas.microsoft.com/office/drawing/2014/main" id="{4763EB04-87F1-3F2B-4457-6CAA38F5B4F5}"/>
-              </a:ext>
-            </a:extLst>
-          </p:cNvPr>
-          <p:cNvSpPr/>
-          <p:nvPr/>
-        </p:nvSpPr>
-        <p:spPr>
-          <a:xfrm>
-            <a:off x="532010" y="3436976"/>
-            <a:ext cx="3041040" cy="479751"/>
-          </a:xfrm>
-          <a:prstGeom prst="rect">
-            <a:avLst/>
-          </a:prstGeom>
-          <a:noFill/>
-          <a:ln w="38100">
-            <a:solidFill>
-              <a:schemeClr val="tx1"/>
-            </a:solidFill>
-          </a:ln>
-        </p:spPr>
-        <p:style>
-          <a:lnRef idx="2">
-            <a:schemeClr val="accent1">
-              <a:shade val="15000"/>
-            </a:schemeClr>
-          </a:lnRef>
-          <a:fillRef idx="1">
-            <a:schemeClr val="accent1"/>
-          </a:fillRef>
-          <a:effectRef idx="0">
-            <a:schemeClr val="accent1"/>
-          </a:effectRef>
-          <a:fontRef idx="minor">
-            <a:schemeClr val="lt1"/>
-          </a:fontRef>
-        </p:style>
-        <p:txBody>
-          <a:bodyPr rtlCol="0" anchor="ctr"/>
-          <a:lstStyle/>
-          <a:p>
-            <a:pPr algn="ctr"/>
-            <a:endParaRPr lang="es-ES"/>
-          </a:p>
-        </p:txBody>
-      </p:sp>
-      <p:sp>
-        <p:nvSpPr>
-          <p:cNvPr id="9" name="Rectángulo 8">
-            <a:extLst>
-              <a:ext uri="{FF2B5EF4-FFF2-40B4-BE49-F238E27FC236}">
-                <a16:creationId xmlns:a16="http://schemas.microsoft.com/office/drawing/2014/main" id="{D417D3AA-6FB1-409E-7650-A400338053D8}"/>
-              </a:ext>
-            </a:extLst>
-          </p:cNvPr>
-          <p:cNvSpPr/>
-          <p:nvPr/>
-        </p:nvSpPr>
-        <p:spPr>
-          <a:xfrm>
-            <a:off x="532010" y="3916727"/>
-            <a:ext cx="3041040" cy="479751"/>
-          </a:xfrm>
-          <a:prstGeom prst="rect">
-            <a:avLst/>
-          </a:prstGeom>
-          <a:noFill/>
-          <a:ln w="38100">
-            <a:solidFill>
-              <a:schemeClr val="tx1"/>
-            </a:solidFill>
-          </a:ln>
-        </p:spPr>
-        <p:style>
-          <a:lnRef idx="2">
-            <a:schemeClr val="accent1">
-              <a:shade val="15000"/>
-            </a:schemeClr>
-          </a:lnRef>
-          <a:fillRef idx="1">
-            <a:schemeClr val="accent1"/>
-          </a:fillRef>
-          <a:effectRef idx="0">
-            <a:schemeClr val="accent1"/>
-          </a:effectRef>
-          <a:fontRef idx="minor">
-            <a:schemeClr val="lt1"/>
-          </a:fontRef>
-        </p:style>
-        <p:txBody>
-          <a:bodyPr rtlCol="0" anchor="ctr"/>
-          <a:lstStyle/>
-          <a:p>
-            <a:pPr algn="ctr"/>
-            <a:endParaRPr lang="es-ES"/>
-          </a:p>
-        </p:txBody>
-      </p:sp>
-      <p:sp>
-        <p:nvSpPr>
-          <p:cNvPr id="10" name="Rectángulo 9">
-            <a:extLst>
-              <a:ext uri="{FF2B5EF4-FFF2-40B4-BE49-F238E27FC236}">
-                <a16:creationId xmlns:a16="http://schemas.microsoft.com/office/drawing/2014/main" id="{7D5E29DD-3D3B-7805-4AD3-455A0DB16B5F}"/>
-              </a:ext>
-            </a:extLst>
-          </p:cNvPr>
-          <p:cNvSpPr/>
-          <p:nvPr/>
-        </p:nvSpPr>
-        <p:spPr>
-          <a:xfrm>
-            <a:off x="4105059" y="2062486"/>
-            <a:ext cx="4341659" cy="479751"/>
-          </a:xfrm>
-          <a:prstGeom prst="rect">
-            <a:avLst/>
-          </a:prstGeom>
-          <a:noFill/>
-          <a:ln w="38100">
-            <a:solidFill>
-              <a:schemeClr val="tx1"/>
-            </a:solidFill>
-          </a:ln>
-        </p:spPr>
-        <p:style>
-          <a:lnRef idx="2">
-            <a:schemeClr val="accent1">
-              <a:shade val="15000"/>
-            </a:schemeClr>
-          </a:lnRef>
-          <a:fillRef idx="1">
-            <a:schemeClr val="accent1"/>
-          </a:fillRef>
-          <a:effectRef idx="0">
-            <a:schemeClr val="accent1"/>
-          </a:effectRef>
-          <a:fontRef idx="minor">
-            <a:schemeClr val="lt1"/>
-          </a:fontRef>
-        </p:style>
-        <p:txBody>
-          <a:bodyPr rtlCol="0" anchor="ctr"/>
-          <a:lstStyle/>
-          <a:p>
-            <a:pPr algn="ctr"/>
-            <a:endParaRPr lang="es-ES"/>
-          </a:p>
-        </p:txBody>
-      </p:sp>
-      <p:sp>
-        <p:nvSpPr>
-          <p:cNvPr id="11" name="Rectángulo 10">
-            <a:extLst>
-              <a:ext uri="{FF2B5EF4-FFF2-40B4-BE49-F238E27FC236}">
-                <a16:creationId xmlns:a16="http://schemas.microsoft.com/office/drawing/2014/main" id="{F91B6D34-86A4-3555-11C0-78182CE84EA5}"/>
-              </a:ext>
-            </a:extLst>
-          </p:cNvPr>
-          <p:cNvSpPr/>
-          <p:nvPr/>
-        </p:nvSpPr>
-        <p:spPr>
-          <a:xfrm>
-            <a:off x="4105051" y="3905009"/>
-            <a:ext cx="4341659" cy="479751"/>
-          </a:xfrm>
-          <a:prstGeom prst="rect">
-            <a:avLst/>
-          </a:prstGeom>
-          <a:noFill/>
-          <a:ln w="38100">
-            <a:solidFill>
-              <a:schemeClr val="tx1"/>
-            </a:solidFill>
-          </a:ln>
-        </p:spPr>
-        <p:style>
-          <a:lnRef idx="2">
-            <a:schemeClr val="accent1">
-              <a:shade val="15000"/>
-            </a:schemeClr>
-          </a:lnRef>
-          <a:fillRef idx="1">
-            <a:schemeClr val="accent1"/>
-          </a:fillRef>
-          <a:effectRef idx="0">
-            <a:schemeClr val="accent1"/>
-          </a:effectRef>
-          <a:fontRef idx="minor">
-            <a:schemeClr val="lt1"/>
-          </a:fontRef>
-        </p:style>
-        <p:txBody>
-          <a:bodyPr rtlCol="0" anchor="ctr"/>
-          <a:lstStyle/>
-          <a:p>
-            <a:pPr algn="ctr"/>
-            <a:endParaRPr lang="es-ES"/>
-          </a:p>
-        </p:txBody>
-      </p:sp>
-      <p:sp>
-        <p:nvSpPr>
-          <p:cNvPr id="12" name="Rectángulo 11">
-            <a:extLst>
-              <a:ext uri="{FF2B5EF4-FFF2-40B4-BE49-F238E27FC236}">
-                <a16:creationId xmlns:a16="http://schemas.microsoft.com/office/drawing/2014/main" id="{6C44A43C-0039-97C8-8252-FAB9FD08B186}"/>
-              </a:ext>
-            </a:extLst>
-          </p:cNvPr>
-          <p:cNvSpPr/>
-          <p:nvPr/>
-        </p:nvSpPr>
-        <p:spPr>
-          <a:xfrm>
-            <a:off x="4105056" y="4359771"/>
-            <a:ext cx="4341659" cy="479751"/>
-          </a:xfrm>
-          <a:prstGeom prst="rect">
-            <a:avLst/>
-          </a:prstGeom>
-          <a:noFill/>
-          <a:ln w="38100">
-            <a:solidFill>
-              <a:schemeClr val="tx1"/>
-            </a:solidFill>
-          </a:ln>
-        </p:spPr>
-        <p:style>
-          <a:lnRef idx="2">
-            <a:schemeClr val="accent1">
-              <a:shade val="15000"/>
-            </a:schemeClr>
-          </a:lnRef>
-          <a:fillRef idx="1">
-            <a:schemeClr val="accent1"/>
-          </a:fillRef>
-          <a:effectRef idx="0">
-            <a:schemeClr val="accent1"/>
-          </a:effectRef>
-          <a:fontRef idx="minor">
-            <a:schemeClr val="lt1"/>
-          </a:fontRef>
-        </p:style>
-        <p:txBody>
-          <a:bodyPr rtlCol="0" anchor="ctr"/>
-          <a:lstStyle/>
-          <a:p>
-            <a:pPr algn="ctr"/>
-            <a:endParaRPr lang="es-ES"/>
-          </a:p>
-        </p:txBody>
-      </p:sp>
-    </p:spTree>
-    <p:extLst>
-      <p:ext uri="{BB962C8B-B14F-4D97-AF65-F5344CB8AC3E}">
-        <p14:creationId xmlns:p14="http://schemas.microsoft.com/office/powerpoint/2010/main" val="3971697560"/>
-      </p:ext>
-    </p:extLst>
-  </p:cSld>
-  <p:clrMapOvr>
-    <a:masterClrMapping/>
-  </p:clrMapOvr>
-  <p:timing>
-    <p:tnLst>
-      <p:par>
-        <p:cTn id="1" dur="indefinite" restart="never" nodeType="tmRoot">
-          <p:childTnLst>
-            <p:seq concurrent="1" nextAc="seek">
-              <p:cTn id="2" dur="indefinite" nodeType="mainSeq">
-                <p:childTnLst>
-                  <p:par>
-                    <p:cTn id="3" fill="hold">
-                      <p:stCondLst>
-                        <p:cond delay="indefinite"/>
-                      </p:stCondLst>
-                      <p:childTnLst>
-                        <p:par>
-                          <p:cTn id="4" fill="hold">
-                            <p:stCondLst>
-                              <p:cond delay="0"/>
-                            </p:stCondLst>
-                            <p:childTnLst>
-                              <p:par>
-                                <p:cTn id="5" presetID="1" presetClass="entr" presetSubtype="0" fill="hold" grpId="0" nodeType="clickEffect">
-                                  <p:stCondLst>
-                                    <p:cond delay="0"/>
-                                  </p:stCondLst>
-                                  <p:childTnLst>
-                                    <p:set>
-                                      <p:cBhvr>
-                                        <p:cTn id="6" dur="1" fill="hold">
-                                          <p:stCondLst>
-                                            <p:cond delay="0"/>
-                                          </p:stCondLst>
-                                        </p:cTn>
-                                        <p:tgtEl>
-                                          <p:spTgt spid="10"/>
-                                        </p:tgtEl>
-                                        <p:attrNameLst>
-                                          <p:attrName>style.visibility</p:attrName>
-                                        </p:attrNameLst>
-                                      </p:cBhvr>
-                                      <p:to>
-                                        <p:strVal val="visible"/>
-                                      </p:to>
-                                    </p:set>
-                                  </p:childTnLst>
-                                </p:cTn>
-                              </p:par>
-                              <p:par>
-                                <p:cTn id="7" presetID="1" presetClass="entr" presetSubtype="0" fill="hold" grpId="0" nodeType="withEffect">
-                                  <p:stCondLst>
-                                    <p:cond delay="0"/>
-                                  </p:stCondLst>
-                                  <p:childTnLst>
-                                    <p:set>
-                                      <p:cBhvr>
-                                        <p:cTn id="8" dur="1" fill="hold">
-                                          <p:stCondLst>
-                                            <p:cond delay="0"/>
-                                          </p:stCondLst>
-                                        </p:cTn>
-                                        <p:tgtEl>
-                                          <p:spTgt spid="7"/>
-                                        </p:tgtEl>
-                                        <p:attrNameLst>
-                                          <p:attrName>style.visibility</p:attrName>
-                                        </p:attrNameLst>
-                                      </p:cBhvr>
-                                      <p:to>
-                                        <p:strVal val="visible"/>
-                                      </p:to>
-                                    </p:set>
-                                  </p:childTnLst>
-                                </p:cTn>
-                              </p:par>
-                              <p:par>
-                                <p:cTn id="9" presetID="1" presetClass="entr" presetSubtype="0" fill="hold" grpId="0" nodeType="withEffect">
-                                  <p:stCondLst>
-                                    <p:cond delay="0"/>
-                                  </p:stCondLst>
-                                  <p:childTnLst>
-                                    <p:set>
-                                      <p:cBhvr>
-                                        <p:cTn id="10" dur="1" fill="hold">
-                                          <p:stCondLst>
-                                            <p:cond delay="0"/>
-                                          </p:stCondLst>
-                                        </p:cTn>
-                                        <p:tgtEl>
-                                          <p:spTgt spid="4"/>
-                                        </p:tgtEl>
-                                        <p:attrNameLst>
-                                          <p:attrName>style.visibility</p:attrName>
-                                        </p:attrNameLst>
-                                      </p:cBhvr>
-                                      <p:to>
-                                        <p:strVal val="visible"/>
-                                      </p:to>
-                                    </p:set>
-                                  </p:childTnLst>
-                                </p:cTn>
-                              </p:par>
-                              <p:par>
-                                <p:cTn id="11" presetID="1" presetClass="entr" presetSubtype="0" fill="hold" grpId="0" nodeType="withEffect">
-                                  <p:stCondLst>
-                                    <p:cond delay="0"/>
-                                  </p:stCondLst>
-                                  <p:childTnLst>
-                                    <p:set>
-                                      <p:cBhvr>
-                                        <p:cTn id="12" dur="1" fill="hold">
-                                          <p:stCondLst>
-                                            <p:cond delay="0"/>
-                                          </p:stCondLst>
-                                        </p:cTn>
-                                        <p:tgtEl>
-                                          <p:spTgt spid="9"/>
-                                        </p:tgtEl>
-                                        <p:attrNameLst>
-                                          <p:attrName>style.visibility</p:attrName>
-                                        </p:attrNameLst>
-                                      </p:cBhvr>
-                                      <p:to>
-                                        <p:strVal val="visible"/>
-                                      </p:to>
-                                    </p:set>
-                                  </p:childTnLst>
-                                </p:cTn>
-                              </p:par>
-                              <p:par>
-                                <p:cTn id="13" presetID="1" presetClass="entr" presetSubtype="0" fill="hold" grpId="0" nodeType="withEffect">
-                                  <p:stCondLst>
-                                    <p:cond delay="0"/>
-                                  </p:stCondLst>
-                                  <p:childTnLst>
-                                    <p:set>
-                                      <p:cBhvr>
-                                        <p:cTn id="14" dur="1" fill="hold">
-                                          <p:stCondLst>
-                                            <p:cond delay="0"/>
-                                          </p:stCondLst>
-                                        </p:cTn>
-                                        <p:tgtEl>
-                                          <p:spTgt spid="11"/>
-                                        </p:tgtEl>
-                                        <p:attrNameLst>
-                                          <p:attrName>style.visibility</p:attrName>
-                                        </p:attrNameLst>
-                                      </p:cBhvr>
-                                      <p:to>
-                                        <p:strVal val="visible"/>
-                                      </p:to>
-                                    </p:set>
-                                  </p:childTnLst>
-                                </p:cTn>
-                              </p:par>
-                              <p:par>
-                                <p:cTn id="15" presetID="1" presetClass="entr" presetSubtype="0" fill="hold" grpId="0" nodeType="withEffect">
-                                  <p:stCondLst>
-                                    <p:cond delay="0"/>
-                                  </p:stCondLst>
-                                  <p:childTnLst>
-                                    <p:set>
-                                      <p:cBhvr>
-                                        <p:cTn id="16" dur="1" fill="hold">
-                                          <p:stCondLst>
-                                            <p:cond delay="0"/>
-                                          </p:stCondLst>
-                                        </p:cTn>
-                                        <p:tgtEl>
-                                          <p:spTgt spid="12"/>
-                                        </p:tgtEl>
-                                        <p:attrNameLst>
-                                          <p:attrName>style.visibility</p:attrName>
-                                        </p:attrNameLst>
-                                      </p:cBhvr>
-                                      <p:to>
-                                        <p:strVal val="visible"/>
-                                      </p:to>
-                                    </p:set>
-                                  </p:childTnLst>
-                                </p:cTn>
-                              </p:par>
-                            </p:childTnLst>
-                          </p:cTn>
-                        </p:par>
-                      </p:childTnLst>
-                    </p:cTn>
-                  </p:par>
-                  <p:par>
-                    <p:cTn id="17" fill="hold">
-                      <p:stCondLst>
-                        <p:cond delay="indefinite"/>
-                      </p:stCondLst>
-                      <p:childTnLst>
-                        <p:par>
-                          <p:cTn id="18" fill="hold">
-                            <p:stCondLst>
-                              <p:cond delay="0"/>
-                            </p:stCondLst>
-                            <p:childTnLst>
-                              <p:par>
-                                <p:cTn id="19" presetID="1" presetClass="entr" presetSubtype="0" fill="hold" grpId="0" nodeType="clickEffect">
-                                  <p:stCondLst>
-                                    <p:cond delay="0"/>
-                                  </p:stCondLst>
-                                  <p:childTnLst>
-                                    <p:set>
-                                      <p:cBhvr>
-                                        <p:cTn id="20" dur="1" fill="hold">
-                                          <p:stCondLst>
-                                            <p:cond delay="0"/>
-                                          </p:stCondLst>
-                                        </p:cTn>
-                                        <p:tgtEl>
-                                          <p:spTgt spid="20"/>
-                                        </p:tgtEl>
-                                        <p:attrNameLst>
-                                          <p:attrName>style.visibility</p:attrName>
-                                        </p:attrNameLst>
-                                      </p:cBhvr>
-                                      <p:to>
-                                        <p:strVal val="visible"/>
-                                      </p:to>
-                                    </p:set>
-                                  </p:childTnLst>
-                                </p:cTn>
-                              </p:par>
-                              <p:par>
-                                <p:cTn id="21" presetID="1" presetClass="entr" presetSubtype="0" fill="hold" grpId="0" nodeType="withEffect">
-                                  <p:stCondLst>
-                                    <p:cond delay="0"/>
-                                  </p:stCondLst>
-                                  <p:childTnLst>
-                                    <p:set>
-                                      <p:cBhvr>
-                                        <p:cTn id="22" dur="1" fill="hold">
-                                          <p:stCondLst>
-                                            <p:cond delay="0"/>
-                                          </p:stCondLst>
-                                        </p:cTn>
-                                        <p:tgtEl>
-                                          <p:spTgt spid="17"/>
-                                        </p:tgtEl>
-                                        <p:attrNameLst>
-                                          <p:attrName>style.visibility</p:attrName>
-                                        </p:attrNameLst>
-                                      </p:cBhvr>
-                                      <p:to>
-                                        <p:strVal val="visible"/>
-                                      </p:to>
-                                    </p:set>
-                                  </p:childTnLst>
-                                </p:cTn>
-                              </p:par>
-                            </p:childTnLst>
-                          </p:cTn>
-                        </p:par>
-                      </p:childTnLst>
-                    </p:cTn>
-                  </p:par>
-                </p:childTnLst>
-              </p:cTn>
-              <p:prevCondLst>
-                <p:cond evt="onPrev" delay="0">
-                  <p:tgtEl>
-                    <p:sldTgt/>
-                  </p:tgtEl>
-                </p:cond>
-              </p:prevCondLst>
-              <p:nextCondLst>
-                <p:cond evt="onNext" delay="0">
-                  <p:tgtEl>
-                    <p:sldTgt/>
-                  </p:tgtEl>
-                </p:cond>
-              </p:nextCondLst>
-            </p:seq>
-          </p:childTnLst>
-        </p:cTn>
-      </p:par>
-    </p:tnLst>
-    <p:bldLst>
-      <p:bldP spid="17" grpId="0" animBg="1"/>
-      <p:bldP spid="20" grpId="0" animBg="1"/>
-      <p:bldP spid="4" grpId="0" animBg="1"/>
-      <p:bldP spid="7" grpId="0" animBg="1"/>
-      <p:bldP spid="9" grpId="0" animBg="1"/>
-      <p:bldP spid="10" grpId="0" animBg="1"/>
-      <p:bldP spid="11" grpId="0" animBg="1"/>
-      <p:bldP spid="12" grpId="0" animBg="1"/>
-    </p:bldLst>
-  </p:timing>
-</p:sld>
-</file>
-
-<file path=ppt/slides/slide5.xml><?xml version="1.0" encoding="utf-8"?>
-<p:sld xmlns:a="http://schemas.openxmlformats.org/drawingml/2006/main" xmlns:r="http://schemas.openxmlformats.org/officeDocument/2006/relationships" xmlns:p="http://schemas.openxmlformats.org/presentationml/2006/main">
-  <p:cSld>
-    <p:spTree>
-      <p:nvGrpSpPr>
-        <p:cNvPr id="1" name=""/>
-        <p:cNvGrpSpPr/>
-        <p:nvPr/>
-      </p:nvGrpSpPr>
-      <p:grpSpPr>
-        <a:xfrm>
-          <a:off x="0" y="0"/>
-          <a:ext cx="0" cy="0"/>
-          <a:chOff x="0" y="0"/>
-          <a:chExt cx="0" cy="0"/>
-        </a:xfrm>
-      </p:grpSpPr>
-      <p:sp>
-        <p:nvSpPr>
-          <p:cNvPr id="5" name="Rectángulo 4">
-            <a:extLst>
-              <a:ext uri="{FF2B5EF4-FFF2-40B4-BE49-F238E27FC236}">
-                <a16:creationId xmlns:a16="http://schemas.microsoft.com/office/drawing/2014/main" id="{F9FA76F6-CE9F-B094-E41B-8B9EC7F0D26E}"/>
-              </a:ext>
-            </a:extLst>
-          </p:cNvPr>
-          <p:cNvSpPr/>
-          <p:nvPr/>
-        </p:nvSpPr>
-        <p:spPr>
-          <a:xfrm>
-            <a:off x="0" y="0"/>
-            <a:ext cx="12192000" cy="6858000"/>
-          </a:xfrm>
-          <a:prstGeom prst="rect">
-            <a:avLst/>
-          </a:prstGeom>
-          <a:solidFill>
-            <a:srgbClr val="54838D"/>
-          </a:solidFill>
-          <a:ln>
-            <a:noFill/>
-          </a:ln>
-        </p:spPr>
-        <p:style>
-          <a:lnRef idx="2">
-            <a:schemeClr val="accent1">
-              <a:shade val="15000"/>
-            </a:schemeClr>
-          </a:lnRef>
-          <a:fillRef idx="1">
-            <a:schemeClr val="accent1"/>
-          </a:fillRef>
-          <a:effectRef idx="0">
-            <a:schemeClr val="accent1"/>
-          </a:effectRef>
-          <a:fontRef idx="minor">
-            <a:schemeClr val="lt1"/>
-          </a:fontRef>
-        </p:style>
-        <p:txBody>
-          <a:bodyPr rtlCol="0" anchor="ctr"/>
-          <a:lstStyle/>
-          <a:p>
-            <a:pPr marL="0" algn="ctr" rtl="0" eaLnBrk="1" fontAlgn="t" latinLnBrk="0" hangingPunct="1">
-              <a:spcBef>
-                <a:spcPts val="0"/>
-              </a:spcBef>
-              <a:spcAft>
-                <a:spcPts val="0"/>
-              </a:spcAft>
-            </a:pPr>
             <a:endParaRPr lang="es-ES" sz="1800" b="0" i="0" u="none" strike="noStrike" dirty="0">
               <a:effectLst/>
               <a:latin typeface="Arial" panose="020B0604020202020204" pitchFamily="34" charset="0"/>
@@ -9151,6 +7868,1486 @@
     <p:bldLst>
       <p:bldP spid="10" grpId="0" animBg="1"/>
       <p:bldP spid="11" grpId="0"/>
+    </p:bldLst>
+  </p:timing>
+</p:sld>
+</file>
+
+<file path=ppt/slides/slide5.xml><?xml version="1.0" encoding="utf-8"?>
+<p:sld xmlns:a="http://schemas.openxmlformats.org/drawingml/2006/main" xmlns:r="http://schemas.openxmlformats.org/officeDocument/2006/relationships" xmlns:p="http://schemas.openxmlformats.org/presentationml/2006/main">
+  <p:cSld>
+    <p:spTree>
+      <p:nvGrpSpPr>
+        <p:cNvPr id="1" name=""/>
+        <p:cNvGrpSpPr/>
+        <p:nvPr/>
+      </p:nvGrpSpPr>
+      <p:grpSpPr>
+        <a:xfrm>
+          <a:off x="0" y="0"/>
+          <a:ext cx="0" cy="0"/>
+          <a:chOff x="0" y="0"/>
+          <a:chExt cx="0" cy="0"/>
+        </a:xfrm>
+      </p:grpSpPr>
+      <p:sp>
+        <p:nvSpPr>
+          <p:cNvPr id="5" name="Rectángulo 4">
+            <a:extLst>
+              <a:ext uri="{FF2B5EF4-FFF2-40B4-BE49-F238E27FC236}">
+                <a16:creationId xmlns:a16="http://schemas.microsoft.com/office/drawing/2014/main" id="{F9FA76F6-CE9F-B094-E41B-8B9EC7F0D26E}"/>
+              </a:ext>
+            </a:extLst>
+          </p:cNvPr>
+          <p:cNvSpPr/>
+          <p:nvPr/>
+        </p:nvSpPr>
+        <p:spPr>
+          <a:xfrm>
+            <a:off x="0" y="0"/>
+            <a:ext cx="12192000" cy="6858000"/>
+          </a:xfrm>
+          <a:prstGeom prst="rect">
+            <a:avLst/>
+          </a:prstGeom>
+          <a:solidFill>
+            <a:srgbClr val="54838D"/>
+          </a:solidFill>
+          <a:ln>
+            <a:noFill/>
+          </a:ln>
+        </p:spPr>
+        <p:style>
+          <a:lnRef idx="2">
+            <a:schemeClr val="accent1">
+              <a:shade val="15000"/>
+            </a:schemeClr>
+          </a:lnRef>
+          <a:fillRef idx="1">
+            <a:schemeClr val="accent1"/>
+          </a:fillRef>
+          <a:effectRef idx="0">
+            <a:schemeClr val="accent1"/>
+          </a:effectRef>
+          <a:fontRef idx="minor">
+            <a:schemeClr val="lt1"/>
+          </a:fontRef>
+        </p:style>
+        <p:txBody>
+          <a:bodyPr rtlCol="0" anchor="ctr"/>
+          <a:lstStyle/>
+          <a:p>
+            <a:pPr marL="0" algn="ctr" rtl="0" eaLnBrk="1" fontAlgn="t" latinLnBrk="0" hangingPunct="1">
+              <a:spcBef>
+                <a:spcPts val="0"/>
+              </a:spcBef>
+              <a:spcAft>
+                <a:spcPts val="0"/>
+              </a:spcAft>
+            </a:pPr>
+            <a:r>
+              <a:rPr lang="es-ES" sz="1800" b="1" i="0" u="none" strike="noStrike" kern="1200">
+                <a:solidFill>
+                  <a:srgbClr val="FFFFFF"/>
+                </a:solidFill>
+                <a:effectLst/>
+                <a:latin typeface="Calibri" panose="020F0502020204030204" pitchFamily="34" charset="0"/>
+              </a:rPr>
+              <a:t>Features</a:t>
+            </a:r>
+            <a:endParaRPr lang="es-ES" sz="1800" b="0" i="0" u="none" strike="noStrike">
+              <a:effectLst/>
+              <a:latin typeface="Arial" panose="020B0604020202020204" pitchFamily="34" charset="0"/>
+            </a:endParaRPr>
+          </a:p>
+          <a:p>
+            <a:pPr marL="0" algn="ctr" rtl="0" eaLnBrk="1" fontAlgn="ctr" latinLnBrk="0" hangingPunct="1">
+              <a:spcBef>
+                <a:spcPts val="0"/>
+              </a:spcBef>
+              <a:spcAft>
+                <a:spcPts val="0"/>
+              </a:spcAft>
+            </a:pPr>
+            <a:r>
+              <a:rPr lang="es-ES" sz="1800" b="0" i="0" u="none" strike="noStrike" kern="1200">
+                <a:solidFill>
+                  <a:srgbClr val="000000"/>
+                </a:solidFill>
+                <a:effectLst/>
+                <a:latin typeface="Calibri" panose="020F0502020204030204" pitchFamily="34" charset="0"/>
+              </a:rPr>
+              <a:t>Codigo_provincia</a:t>
+            </a:r>
+            <a:endParaRPr lang="es-ES" sz="1800" b="0" i="0" u="none" strike="noStrike" dirty="0">
+              <a:effectLst/>
+              <a:latin typeface="Arial" panose="020B0604020202020204" pitchFamily="34" charset="0"/>
+            </a:endParaRPr>
+          </a:p>
+        </p:txBody>
+      </p:sp>
+      <p:sp>
+        <p:nvSpPr>
+          <p:cNvPr id="8" name="Rectángulo redondeado 7">
+            <a:extLst>
+              <a:ext uri="{FF2B5EF4-FFF2-40B4-BE49-F238E27FC236}">
+                <a16:creationId xmlns:a16="http://schemas.microsoft.com/office/drawing/2014/main" id="{A1B2B0D3-1ACE-917E-8149-298FC4BE514D}"/>
+              </a:ext>
+            </a:extLst>
+          </p:cNvPr>
+          <p:cNvSpPr/>
+          <p:nvPr/>
+        </p:nvSpPr>
+        <p:spPr>
+          <a:xfrm>
+            <a:off x="167195" y="200968"/>
+            <a:ext cx="8701232" cy="6224884"/>
+          </a:xfrm>
+          <a:prstGeom prst="roundRect">
+            <a:avLst/>
+          </a:prstGeom>
+          <a:solidFill>
+            <a:schemeClr val="bg1">
+              <a:alpha val="87000"/>
+            </a:schemeClr>
+          </a:solidFill>
+          <a:ln>
+            <a:noFill/>
+          </a:ln>
+        </p:spPr>
+        <p:style>
+          <a:lnRef idx="2">
+            <a:schemeClr val="accent1">
+              <a:shade val="15000"/>
+            </a:schemeClr>
+          </a:lnRef>
+          <a:fillRef idx="1">
+            <a:schemeClr val="accent1"/>
+          </a:fillRef>
+          <a:effectRef idx="0">
+            <a:schemeClr val="accent1"/>
+          </a:effectRef>
+          <a:fontRef idx="minor">
+            <a:schemeClr val="lt1"/>
+          </a:fontRef>
+        </p:style>
+        <p:txBody>
+          <a:bodyPr rtlCol="0" anchor="ctr"/>
+          <a:lstStyle/>
+          <a:p>
+            <a:pPr algn="ctr"/>
+            <a:endParaRPr lang="es-ES" sz="6000" dirty="0">
+              <a:solidFill>
+                <a:schemeClr val="tx1"/>
+              </a:solidFill>
+            </a:endParaRPr>
+          </a:p>
+        </p:txBody>
+      </p:sp>
+      <p:graphicFrame>
+        <p:nvGraphicFramePr>
+          <p:cNvPr id="2" name="Tabla 2">
+            <a:extLst>
+              <a:ext uri="{FF2B5EF4-FFF2-40B4-BE49-F238E27FC236}">
+                <a16:creationId xmlns:a16="http://schemas.microsoft.com/office/drawing/2014/main" id="{9FC3886B-511A-6CD1-D789-8BC687BBA5E8}"/>
+              </a:ext>
+            </a:extLst>
+          </p:cNvPr>
+          <p:cNvGraphicFramePr>
+            <a:graphicFrameLocks noGrp="1"/>
+          </p:cNvGraphicFramePr>
+          <p:nvPr>
+            <p:extLst>
+              <p:ext uri="{D42A27DB-BD31-4B8C-83A1-F6EECF244321}">
+                <p14:modId xmlns:p14="http://schemas.microsoft.com/office/powerpoint/2010/main" val="4049248958"/>
+              </p:ext>
+            </p:extLst>
+          </p:nvPr>
+        </p:nvGraphicFramePr>
+        <p:xfrm>
+          <a:off x="532010" y="747801"/>
+          <a:ext cx="3041040" cy="4081549"/>
+        </p:xfrm>
+        <a:graphic>
+          <a:graphicData uri="http://schemas.openxmlformats.org/drawingml/2006/table">
+            <a:tbl>
+              <a:tblPr firstRow="1" bandRow="1">
+                <a:tableStyleId>{9DCAF9ED-07DC-4A11-8D7F-57B35C25682E}</a:tableStyleId>
+              </a:tblPr>
+              <a:tblGrid>
+                <a:gridCol w="3041040">
+                  <a:extLst>
+                    <a:ext uri="{9D8B030D-6E8A-4147-A177-3AD203B41FA5}">
+                      <a16:colId xmlns:a16="http://schemas.microsoft.com/office/drawing/2014/main" val="65502804"/>
+                    </a:ext>
+                  </a:extLst>
+                </a:gridCol>
+              </a:tblGrid>
+              <a:tr h="398949">
+                <a:tc>
+                  <a:txBody>
+                    <a:bodyPr/>
+                    <a:lstStyle/>
+                    <a:p>
+                      <a:pPr algn="ctr"/>
+                      <a:r>
+                        <a:rPr lang="es-ES" sz="2000" dirty="0" err="1"/>
+                        <a:t>Features</a:t>
+                      </a:r>
+                      <a:endParaRPr lang="es-ES" sz="2000" dirty="0"/>
+                    </a:p>
+                  </a:txBody>
+                  <a:tcPr/>
+                </a:tc>
+                <a:extLst>
+                  <a:ext uri="{0D108BD9-81ED-4DB2-BD59-A6C34878D82A}">
+                    <a16:rowId xmlns:a16="http://schemas.microsoft.com/office/drawing/2014/main" val="3469306187"/>
+                  </a:ext>
+                </a:extLst>
+              </a:tr>
+              <a:tr h="460325">
+                <a:tc>
+                  <a:txBody>
+                    <a:bodyPr/>
+                    <a:lstStyle/>
+                    <a:p>
+                      <a:pPr algn="ctr"/>
+                      <a:r>
+                        <a:rPr lang="es-ES" sz="2000" dirty="0" err="1">
+                          <a:effectLst/>
+                        </a:rPr>
+                        <a:t>Codigo_provincia</a:t>
+                      </a:r>
+                      <a:endParaRPr lang="es-ES" sz="2000" dirty="0">
+                        <a:effectLst/>
+                      </a:endParaRPr>
+                    </a:p>
+                  </a:txBody>
+                  <a:tcPr marL="76200" marR="76200" marT="76200" marB="76200" anchor="ctr"/>
+                </a:tc>
+                <a:extLst>
+                  <a:ext uri="{0D108BD9-81ED-4DB2-BD59-A6C34878D82A}">
+                    <a16:rowId xmlns:a16="http://schemas.microsoft.com/office/drawing/2014/main" val="506371762"/>
+                  </a:ext>
+                </a:extLst>
+              </a:tr>
+              <a:tr h="460325">
+                <a:tc>
+                  <a:txBody>
+                    <a:bodyPr/>
+                    <a:lstStyle/>
+                    <a:p>
+                      <a:pPr algn="ctr"/>
+                      <a:r>
+                        <a:rPr lang="es-ES" sz="2000" dirty="0">
+                          <a:effectLst/>
+                        </a:rPr>
+                        <a:t>Provincia</a:t>
+                      </a:r>
+                    </a:p>
+                  </a:txBody>
+                  <a:tcPr marL="76200" marR="76200" marT="76200" marB="76200" anchor="ctr"/>
+                </a:tc>
+                <a:extLst>
+                  <a:ext uri="{0D108BD9-81ED-4DB2-BD59-A6C34878D82A}">
+                    <a16:rowId xmlns:a16="http://schemas.microsoft.com/office/drawing/2014/main" val="903368235"/>
+                  </a:ext>
+                </a:extLst>
+              </a:tr>
+              <a:tr h="460325">
+                <a:tc>
+                  <a:txBody>
+                    <a:bodyPr/>
+                    <a:lstStyle/>
+                    <a:p>
+                      <a:pPr algn="ctr"/>
+                      <a:r>
+                        <a:rPr lang="es-ES" sz="2000" dirty="0" err="1">
+                          <a:effectLst/>
+                        </a:rPr>
+                        <a:t>Codigo_municipio</a:t>
+                      </a:r>
+                      <a:endParaRPr lang="es-ES" sz="2000" dirty="0">
+                        <a:effectLst/>
+                      </a:endParaRPr>
+                    </a:p>
+                  </a:txBody>
+                  <a:tcPr marL="76200" marR="76200" marT="76200" marB="76200" anchor="ctr"/>
+                </a:tc>
+                <a:extLst>
+                  <a:ext uri="{0D108BD9-81ED-4DB2-BD59-A6C34878D82A}">
+                    <a16:rowId xmlns:a16="http://schemas.microsoft.com/office/drawing/2014/main" val="1155914460"/>
+                  </a:ext>
+                </a:extLst>
+              </a:tr>
+              <a:tr h="460325">
+                <a:tc>
+                  <a:txBody>
+                    <a:bodyPr/>
+                    <a:lstStyle/>
+                    <a:p>
+                      <a:pPr algn="ctr"/>
+                      <a:r>
+                        <a:rPr lang="es-ES" sz="2000" dirty="0" err="1">
+                          <a:effectLst/>
+                        </a:rPr>
+                        <a:t>Total_vc</a:t>
+                      </a:r>
+                      <a:endParaRPr lang="es-ES" sz="2000" dirty="0">
+                        <a:effectLst/>
+                      </a:endParaRPr>
+                    </a:p>
+                  </a:txBody>
+                  <a:tcPr marL="76200" marR="76200" marT="76200" marB="76200" anchor="ctr"/>
+                </a:tc>
+                <a:extLst>
+                  <a:ext uri="{0D108BD9-81ED-4DB2-BD59-A6C34878D82A}">
+                    <a16:rowId xmlns:a16="http://schemas.microsoft.com/office/drawing/2014/main" val="760467247"/>
+                  </a:ext>
+                </a:extLst>
+              </a:tr>
+              <a:tr h="460325">
+                <a:tc>
+                  <a:txBody>
+                    <a:bodyPr/>
+                    <a:lstStyle/>
+                    <a:p>
+                      <a:pPr algn="ctr"/>
+                      <a:r>
+                        <a:rPr lang="es-ES" sz="2000" dirty="0" err="1">
+                          <a:effectLst/>
+                        </a:rPr>
+                        <a:t>Total_vu</a:t>
+                      </a:r>
+                      <a:endParaRPr lang="es-ES" sz="2000" dirty="0">
+                        <a:effectLst/>
+                      </a:endParaRPr>
+                    </a:p>
+                  </a:txBody>
+                  <a:tcPr marL="76200" marR="76200" marT="76200" marB="76200" anchor="ctr"/>
+                </a:tc>
+                <a:extLst>
+                  <a:ext uri="{0D108BD9-81ED-4DB2-BD59-A6C34878D82A}">
+                    <a16:rowId xmlns:a16="http://schemas.microsoft.com/office/drawing/2014/main" val="535719876"/>
+                  </a:ext>
+                </a:extLst>
+              </a:tr>
+              <a:tr h="460325">
+                <a:tc>
+                  <a:txBody>
+                    <a:bodyPr/>
+                    <a:lstStyle/>
+                    <a:p>
+                      <a:pPr algn="ctr"/>
+                      <a:r>
+                        <a:rPr lang="es-ES" sz="2000" dirty="0">
+                          <a:effectLst/>
+                        </a:rPr>
+                        <a:t>Alquiler_mes_vc_m2</a:t>
+                      </a:r>
+                    </a:p>
+                  </a:txBody>
+                  <a:tcPr marL="76200" marR="76200" marT="76200" marB="76200" anchor="ctr"/>
+                </a:tc>
+                <a:extLst>
+                  <a:ext uri="{0D108BD9-81ED-4DB2-BD59-A6C34878D82A}">
+                    <a16:rowId xmlns:a16="http://schemas.microsoft.com/office/drawing/2014/main" val="3754357363"/>
+                  </a:ext>
+                </a:extLst>
+              </a:tr>
+              <a:tr h="460325">
+                <a:tc>
+                  <a:txBody>
+                    <a:bodyPr/>
+                    <a:lstStyle/>
+                    <a:p>
+                      <a:pPr algn="ctr"/>
+                      <a:r>
+                        <a:rPr lang="es-ES" sz="2000" dirty="0" err="1">
+                          <a:effectLst/>
+                        </a:rPr>
+                        <a:t>Comunidad_autonoma</a:t>
+                      </a:r>
+                      <a:endParaRPr lang="es-ES" sz="2000" dirty="0">
+                        <a:effectLst/>
+                      </a:endParaRPr>
+                    </a:p>
+                  </a:txBody>
+                  <a:tcPr marL="76200" marR="76200" marT="76200" marB="76200" anchor="ctr"/>
+                </a:tc>
+                <a:extLst>
+                  <a:ext uri="{0D108BD9-81ED-4DB2-BD59-A6C34878D82A}">
+                    <a16:rowId xmlns:a16="http://schemas.microsoft.com/office/drawing/2014/main" val="1462632079"/>
+                  </a:ext>
+                </a:extLst>
+              </a:tr>
+              <a:tr h="460325">
+                <a:tc>
+                  <a:txBody>
+                    <a:bodyPr/>
+                    <a:lstStyle/>
+                    <a:p>
+                      <a:pPr algn="ctr"/>
+                      <a:r>
+                        <a:rPr lang="es-ES" sz="2000" dirty="0" err="1">
+                          <a:effectLst/>
+                        </a:rPr>
+                        <a:t>Poblacion</a:t>
+                      </a:r>
+                      <a:endParaRPr lang="es-ES" sz="2000" dirty="0">
+                        <a:effectLst/>
+                      </a:endParaRPr>
+                    </a:p>
+                  </a:txBody>
+                  <a:tcPr marL="76200" marR="76200" marT="76200" marB="76200" anchor="ctr"/>
+                </a:tc>
+                <a:extLst>
+                  <a:ext uri="{0D108BD9-81ED-4DB2-BD59-A6C34878D82A}">
+                    <a16:rowId xmlns:a16="http://schemas.microsoft.com/office/drawing/2014/main" val="1911219257"/>
+                  </a:ext>
+                </a:extLst>
+              </a:tr>
+            </a:tbl>
+          </a:graphicData>
+        </a:graphic>
+      </p:graphicFrame>
+      <p:graphicFrame>
+        <p:nvGraphicFramePr>
+          <p:cNvPr id="3" name="Tabla 2">
+            <a:extLst>
+              <a:ext uri="{FF2B5EF4-FFF2-40B4-BE49-F238E27FC236}">
+                <a16:creationId xmlns:a16="http://schemas.microsoft.com/office/drawing/2014/main" id="{CFD4E3A8-09F5-4B4D-A5D3-C65E3519A2A5}"/>
+              </a:ext>
+            </a:extLst>
+          </p:cNvPr>
+          <p:cNvGraphicFramePr>
+            <a:graphicFrameLocks noGrp="1"/>
+          </p:cNvGraphicFramePr>
+          <p:nvPr>
+            <p:extLst>
+              <p:ext uri="{D42A27DB-BD31-4B8C-83A1-F6EECF244321}">
+                <p14:modId xmlns:p14="http://schemas.microsoft.com/office/powerpoint/2010/main" val="4290306905"/>
+              </p:ext>
+            </p:extLst>
+          </p:nvPr>
+        </p:nvGraphicFramePr>
+        <p:xfrm>
+          <a:off x="4105060" y="747803"/>
+          <a:ext cx="4341660" cy="4081552"/>
+        </p:xfrm>
+        <a:graphic>
+          <a:graphicData uri="http://schemas.openxmlformats.org/drawingml/2006/table">
+            <a:tbl>
+              <a:tblPr firstRow="1" bandRow="1">
+                <a:tableStyleId>{9DCAF9ED-07DC-4A11-8D7F-57B35C25682E}</a:tableStyleId>
+              </a:tblPr>
+              <a:tblGrid>
+                <a:gridCol w="4341660">
+                  <a:extLst>
+                    <a:ext uri="{9D8B030D-6E8A-4147-A177-3AD203B41FA5}">
+                      <a16:colId xmlns:a16="http://schemas.microsoft.com/office/drawing/2014/main" val="65502804"/>
+                    </a:ext>
+                  </a:extLst>
+                </a:gridCol>
+              </a:tblGrid>
+              <a:tr h="368531">
+                <a:tc>
+                  <a:txBody>
+                    <a:bodyPr/>
+                    <a:lstStyle/>
+                    <a:p>
+                      <a:pPr algn="ctr"/>
+                      <a:r>
+                        <a:rPr lang="es-ES" sz="2000" dirty="0" err="1"/>
+                        <a:t>Features</a:t>
+                      </a:r>
+                      <a:endParaRPr lang="es-ES" sz="2000" dirty="0"/>
+                    </a:p>
+                  </a:txBody>
+                  <a:tcPr/>
+                </a:tc>
+                <a:extLst>
+                  <a:ext uri="{0D108BD9-81ED-4DB2-BD59-A6C34878D82A}">
+                    <a16:rowId xmlns:a16="http://schemas.microsoft.com/office/drawing/2014/main" val="3469306187"/>
+                  </a:ext>
+                </a:extLst>
+              </a:tr>
+              <a:tr h="460664">
+                <a:tc>
+                  <a:txBody>
+                    <a:bodyPr/>
+                    <a:lstStyle/>
+                    <a:p>
+                      <a:pPr algn="ctr"/>
+                      <a:r>
+                        <a:rPr lang="es-ES" sz="2000" dirty="0" err="1">
+                          <a:effectLst/>
+                        </a:rPr>
+                        <a:t>Inmuebles_totales</a:t>
+                      </a:r>
+                      <a:endParaRPr lang="es-ES" sz="2000" dirty="0">
+                        <a:effectLst/>
+                      </a:endParaRPr>
+                    </a:p>
+                  </a:txBody>
+                  <a:tcPr marL="76200" marR="76200" marT="76200" marB="76200" anchor="ctr"/>
+                </a:tc>
+                <a:extLst>
+                  <a:ext uri="{0D108BD9-81ED-4DB2-BD59-A6C34878D82A}">
+                    <a16:rowId xmlns:a16="http://schemas.microsoft.com/office/drawing/2014/main" val="506371762"/>
+                  </a:ext>
+                </a:extLst>
+              </a:tr>
+              <a:tr h="460664">
+                <a:tc>
+                  <a:txBody>
+                    <a:bodyPr/>
+                    <a:lstStyle/>
+                    <a:p>
+                      <a:pPr algn="ctr"/>
+                      <a:r>
+                        <a:rPr lang="es-ES" sz="2000" dirty="0" err="1">
+                          <a:effectLst/>
+                        </a:rPr>
+                        <a:t>Viviendas_turisticas</a:t>
+                      </a:r>
+                      <a:endParaRPr lang="es-ES" sz="2000" dirty="0">
+                        <a:effectLst/>
+                      </a:endParaRPr>
+                    </a:p>
+                  </a:txBody>
+                  <a:tcPr marL="76200" marR="76200" marT="76200" marB="76200" anchor="ctr"/>
+                </a:tc>
+                <a:extLst>
+                  <a:ext uri="{0D108BD9-81ED-4DB2-BD59-A6C34878D82A}">
+                    <a16:rowId xmlns:a16="http://schemas.microsoft.com/office/drawing/2014/main" val="903368235"/>
+                  </a:ext>
+                </a:extLst>
+              </a:tr>
+              <a:tr h="460664">
+                <a:tc>
+                  <a:txBody>
+                    <a:bodyPr/>
+                    <a:lstStyle/>
+                    <a:p>
+                      <a:pPr algn="ctr"/>
+                      <a:r>
+                        <a:rPr lang="es-ES" sz="2000" dirty="0">
+                          <a:effectLst/>
+                        </a:rPr>
+                        <a:t>Turistas</a:t>
+                      </a:r>
+                    </a:p>
+                  </a:txBody>
+                  <a:tcPr marL="76200" marR="76200" marT="76200" marB="76200" anchor="ctr"/>
+                </a:tc>
+                <a:extLst>
+                  <a:ext uri="{0D108BD9-81ED-4DB2-BD59-A6C34878D82A}">
+                    <a16:rowId xmlns:a16="http://schemas.microsoft.com/office/drawing/2014/main" val="1155914460"/>
+                  </a:ext>
+                </a:extLst>
+              </a:tr>
+              <a:tr h="460664">
+                <a:tc>
+                  <a:txBody>
+                    <a:bodyPr/>
+                    <a:lstStyle/>
+                    <a:p>
+                      <a:pPr algn="ctr"/>
+                      <a:r>
+                        <a:rPr lang="es-ES" sz="2000" dirty="0" err="1">
+                          <a:effectLst/>
+                        </a:rPr>
+                        <a:t>Porcentaje_viviendas_turisticas</a:t>
+                      </a:r>
+                      <a:endParaRPr lang="es-ES" sz="2000" dirty="0">
+                        <a:effectLst/>
+                      </a:endParaRPr>
+                    </a:p>
+                  </a:txBody>
+                  <a:tcPr marL="76200" marR="76200" marT="76200" marB="76200" anchor="ctr"/>
+                </a:tc>
+                <a:extLst>
+                  <a:ext uri="{0D108BD9-81ED-4DB2-BD59-A6C34878D82A}">
+                    <a16:rowId xmlns:a16="http://schemas.microsoft.com/office/drawing/2014/main" val="760467247"/>
+                  </a:ext>
+                </a:extLst>
+              </a:tr>
+              <a:tr h="460664">
+                <a:tc>
+                  <a:txBody>
+                    <a:bodyPr/>
+                    <a:lstStyle/>
+                    <a:p>
+                      <a:pPr algn="ctr"/>
+                      <a:r>
+                        <a:rPr lang="es-ES" sz="2000" dirty="0" err="1">
+                          <a:effectLst/>
+                        </a:rPr>
+                        <a:t>Total_casas_alquiler</a:t>
+                      </a:r>
+                      <a:endParaRPr lang="es-ES" sz="2000" dirty="0">
+                        <a:effectLst/>
+                      </a:endParaRPr>
+                    </a:p>
+                  </a:txBody>
+                  <a:tcPr marL="76200" marR="76200" marT="76200" marB="76200" anchor="ctr"/>
+                </a:tc>
+                <a:extLst>
+                  <a:ext uri="{0D108BD9-81ED-4DB2-BD59-A6C34878D82A}">
+                    <a16:rowId xmlns:a16="http://schemas.microsoft.com/office/drawing/2014/main" val="535719876"/>
+                  </a:ext>
+                </a:extLst>
+              </a:tr>
+              <a:tr h="460664">
+                <a:tc>
+                  <a:txBody>
+                    <a:bodyPr/>
+                    <a:lstStyle/>
+                    <a:p>
+                      <a:pPr algn="ctr"/>
+                      <a:r>
+                        <a:rPr lang="es-ES" sz="2000" dirty="0" err="1">
+                          <a:effectLst/>
+                        </a:rPr>
+                        <a:t>Porcentaje_viviendas_alquiler</a:t>
+                      </a:r>
+                      <a:endParaRPr lang="es-ES" sz="2000" dirty="0">
+                        <a:effectLst/>
+                      </a:endParaRPr>
+                    </a:p>
+                  </a:txBody>
+                  <a:tcPr marL="76200" marR="76200" marT="76200" marB="76200" anchor="ctr"/>
+                </a:tc>
+                <a:extLst>
+                  <a:ext uri="{0D108BD9-81ED-4DB2-BD59-A6C34878D82A}">
+                    <a16:rowId xmlns:a16="http://schemas.microsoft.com/office/drawing/2014/main" val="3754357363"/>
+                  </a:ext>
+                </a:extLst>
+              </a:tr>
+              <a:tr h="460664">
+                <a:tc>
+                  <a:txBody>
+                    <a:bodyPr/>
+                    <a:lstStyle/>
+                    <a:p>
+                      <a:pPr algn="ctr"/>
+                      <a:r>
+                        <a:rPr lang="es-ES" sz="2000" dirty="0" err="1">
+                          <a:effectLst/>
+                        </a:rPr>
+                        <a:t>Porcentaje_vc_alquiler</a:t>
+                      </a:r>
+                      <a:endParaRPr lang="es-ES" sz="2000" dirty="0">
+                        <a:effectLst/>
+                      </a:endParaRPr>
+                    </a:p>
+                  </a:txBody>
+                  <a:tcPr marL="76200" marR="76200" marT="76200" marB="76200" anchor="ctr"/>
+                </a:tc>
+                <a:extLst>
+                  <a:ext uri="{0D108BD9-81ED-4DB2-BD59-A6C34878D82A}">
+                    <a16:rowId xmlns:a16="http://schemas.microsoft.com/office/drawing/2014/main" val="1462632079"/>
+                  </a:ext>
+                </a:extLst>
+              </a:tr>
+              <a:tr h="460664">
+                <a:tc>
+                  <a:txBody>
+                    <a:bodyPr/>
+                    <a:lstStyle/>
+                    <a:p>
+                      <a:pPr algn="ctr"/>
+                      <a:r>
+                        <a:rPr lang="es-ES" sz="2000" dirty="0" err="1">
+                          <a:effectLst/>
+                        </a:rPr>
+                        <a:t>Porcentaje_vu_alquiler</a:t>
+                      </a:r>
+                      <a:endParaRPr lang="es-ES" sz="2000" dirty="0">
+                        <a:effectLst/>
+                      </a:endParaRPr>
+                    </a:p>
+                  </a:txBody>
+                  <a:tcPr marL="76200" marR="76200" marT="76200" marB="76200" anchor="ctr"/>
+                </a:tc>
+                <a:extLst>
+                  <a:ext uri="{0D108BD9-81ED-4DB2-BD59-A6C34878D82A}">
+                    <a16:rowId xmlns:a16="http://schemas.microsoft.com/office/drawing/2014/main" val="1911219257"/>
+                  </a:ext>
+                </a:extLst>
+              </a:tr>
+            </a:tbl>
+          </a:graphicData>
+        </a:graphic>
+      </p:graphicFrame>
+      <p:graphicFrame>
+        <p:nvGraphicFramePr>
+          <p:cNvPr id="6" name="Tabla 2">
+            <a:extLst>
+              <a:ext uri="{FF2B5EF4-FFF2-40B4-BE49-F238E27FC236}">
+                <a16:creationId xmlns:a16="http://schemas.microsoft.com/office/drawing/2014/main" id="{D34ECB66-DA24-AC91-DEDE-E6DB9E0EC425}"/>
+              </a:ext>
+            </a:extLst>
+          </p:cNvPr>
+          <p:cNvGraphicFramePr>
+            <a:graphicFrameLocks noGrp="1"/>
+          </p:cNvGraphicFramePr>
+          <p:nvPr>
+            <p:extLst>
+              <p:ext uri="{D42A27DB-BD31-4B8C-83A1-F6EECF244321}">
+                <p14:modId xmlns:p14="http://schemas.microsoft.com/office/powerpoint/2010/main" val="1829420841"/>
+              </p:ext>
+            </p:extLst>
+          </p:nvPr>
+        </p:nvGraphicFramePr>
+        <p:xfrm>
+          <a:off x="2403259" y="5250923"/>
+          <a:ext cx="3041040" cy="859274"/>
+        </p:xfrm>
+        <a:graphic>
+          <a:graphicData uri="http://schemas.openxmlformats.org/drawingml/2006/table">
+            <a:tbl>
+              <a:tblPr firstRow="1" bandRow="1">
+                <a:tableStyleId>{9DCAF9ED-07DC-4A11-8D7F-57B35C25682E}</a:tableStyleId>
+              </a:tblPr>
+              <a:tblGrid>
+                <a:gridCol w="3041040">
+                  <a:extLst>
+                    <a:ext uri="{9D8B030D-6E8A-4147-A177-3AD203B41FA5}">
+                      <a16:colId xmlns:a16="http://schemas.microsoft.com/office/drawing/2014/main" val="65502804"/>
+                    </a:ext>
+                  </a:extLst>
+                </a:gridCol>
+              </a:tblGrid>
+              <a:tr h="398949">
+                <a:tc>
+                  <a:txBody>
+                    <a:bodyPr/>
+                    <a:lstStyle/>
+                    <a:p>
+                      <a:pPr algn="ctr"/>
+                      <a:r>
+                        <a:rPr lang="es-ES" sz="2000" dirty="0"/>
+                        <a:t>Target</a:t>
+                      </a:r>
+                    </a:p>
+                  </a:txBody>
+                  <a:tcPr/>
+                </a:tc>
+                <a:extLst>
+                  <a:ext uri="{0D108BD9-81ED-4DB2-BD59-A6C34878D82A}">
+                    <a16:rowId xmlns:a16="http://schemas.microsoft.com/office/drawing/2014/main" val="3469306187"/>
+                  </a:ext>
+                </a:extLst>
+              </a:tr>
+              <a:tr h="460325">
+                <a:tc>
+                  <a:txBody>
+                    <a:bodyPr/>
+                    <a:lstStyle/>
+                    <a:p>
+                      <a:pPr algn="ctr"/>
+                      <a:r>
+                        <a:rPr lang="es-ES" sz="2000" dirty="0">
+                          <a:effectLst/>
+                        </a:rPr>
+                        <a:t>Alquiler_mes_vu_m2</a:t>
+                      </a:r>
+                    </a:p>
+                  </a:txBody>
+                  <a:tcPr marL="76200" marR="76200" marT="76200" marB="76200" anchor="ctr"/>
+                </a:tc>
+                <a:extLst>
+                  <a:ext uri="{0D108BD9-81ED-4DB2-BD59-A6C34878D82A}">
+                    <a16:rowId xmlns:a16="http://schemas.microsoft.com/office/drawing/2014/main" val="506371762"/>
+                  </a:ext>
+                </a:extLst>
+              </a:tr>
+            </a:tbl>
+          </a:graphicData>
+        </a:graphic>
+      </p:graphicFrame>
+      <p:sp>
+        <p:nvSpPr>
+          <p:cNvPr id="17" name="Rectángulo redondeado 16">
+            <a:extLst>
+              <a:ext uri="{FF2B5EF4-FFF2-40B4-BE49-F238E27FC236}">
+                <a16:creationId xmlns:a16="http://schemas.microsoft.com/office/drawing/2014/main" id="{7A7060FB-D264-1A83-72AA-0C514C376878}"/>
+              </a:ext>
+            </a:extLst>
+          </p:cNvPr>
+          <p:cNvSpPr/>
+          <p:nvPr/>
+        </p:nvSpPr>
+        <p:spPr>
+          <a:xfrm>
+            <a:off x="9136783" y="1396935"/>
+            <a:ext cx="2786861" cy="1622110"/>
+          </a:xfrm>
+          <a:prstGeom prst="roundRect">
+            <a:avLst/>
+          </a:prstGeom>
+          <a:solidFill>
+            <a:schemeClr val="bg1">
+              <a:alpha val="87000"/>
+            </a:schemeClr>
+          </a:solidFill>
+          <a:ln>
+            <a:noFill/>
+          </a:ln>
+        </p:spPr>
+        <p:style>
+          <a:lnRef idx="2">
+            <a:schemeClr val="accent1">
+              <a:shade val="15000"/>
+            </a:schemeClr>
+          </a:lnRef>
+          <a:fillRef idx="1">
+            <a:schemeClr val="accent1"/>
+          </a:fillRef>
+          <a:effectRef idx="0">
+            <a:schemeClr val="accent1"/>
+          </a:effectRef>
+          <a:fontRef idx="minor">
+            <a:schemeClr val="lt1"/>
+          </a:fontRef>
+        </p:style>
+        <p:txBody>
+          <a:bodyPr rtlCol="0" anchor="ctr"/>
+          <a:lstStyle/>
+          <a:p>
+            <a:r>
+              <a:rPr lang="es-ES" sz="2800" u="sng" dirty="0">
+                <a:solidFill>
+                  <a:schemeClr val="tx1"/>
+                </a:solidFill>
+              </a:rPr>
+              <a:t>Instancias:</a:t>
+            </a:r>
+          </a:p>
+          <a:p>
+            <a:pPr algn="ctr"/>
+            <a:r>
+              <a:rPr lang="es-ES" sz="4000" dirty="0">
+                <a:solidFill>
+                  <a:schemeClr val="tx1"/>
+                </a:solidFill>
+              </a:rPr>
+              <a:t>2033</a:t>
+            </a:r>
+          </a:p>
+        </p:txBody>
+      </p:sp>
+      <p:sp>
+        <p:nvSpPr>
+          <p:cNvPr id="20" name="Rectángulo redondeado 19">
+            <a:extLst>
+              <a:ext uri="{FF2B5EF4-FFF2-40B4-BE49-F238E27FC236}">
+                <a16:creationId xmlns:a16="http://schemas.microsoft.com/office/drawing/2014/main" id="{1DF931E0-6EF8-D4FB-39A2-B8DFEA4A029A}"/>
+              </a:ext>
+            </a:extLst>
+          </p:cNvPr>
+          <p:cNvSpPr/>
+          <p:nvPr/>
+        </p:nvSpPr>
+        <p:spPr>
+          <a:xfrm>
+            <a:off x="9187060" y="4127467"/>
+            <a:ext cx="2786861" cy="1622110"/>
+          </a:xfrm>
+          <a:prstGeom prst="roundRect">
+            <a:avLst/>
+          </a:prstGeom>
+          <a:solidFill>
+            <a:schemeClr val="bg1">
+              <a:alpha val="87000"/>
+            </a:schemeClr>
+          </a:solidFill>
+          <a:ln>
+            <a:noFill/>
+          </a:ln>
+        </p:spPr>
+        <p:style>
+          <a:lnRef idx="2">
+            <a:schemeClr val="accent1">
+              <a:shade val="15000"/>
+            </a:schemeClr>
+          </a:lnRef>
+          <a:fillRef idx="1">
+            <a:schemeClr val="accent1"/>
+          </a:fillRef>
+          <a:effectRef idx="0">
+            <a:schemeClr val="accent1"/>
+          </a:effectRef>
+          <a:fontRef idx="minor">
+            <a:schemeClr val="lt1"/>
+          </a:fontRef>
+        </p:style>
+        <p:txBody>
+          <a:bodyPr rtlCol="0" anchor="ctr"/>
+          <a:lstStyle/>
+          <a:p>
+            <a:r>
+              <a:rPr lang="es-ES" sz="2800" u="sng" dirty="0">
+                <a:solidFill>
+                  <a:schemeClr val="tx1"/>
+                </a:solidFill>
+              </a:rPr>
+              <a:t>Año de datos:</a:t>
+            </a:r>
+          </a:p>
+          <a:p>
+            <a:pPr algn="ctr"/>
+            <a:r>
+              <a:rPr lang="es-ES" sz="4000" dirty="0">
+                <a:solidFill>
+                  <a:schemeClr val="tx1"/>
+                </a:solidFill>
+              </a:rPr>
+              <a:t>2021</a:t>
+            </a:r>
+          </a:p>
+        </p:txBody>
+      </p:sp>
+      <p:sp>
+        <p:nvSpPr>
+          <p:cNvPr id="4" name="Rectángulo 3">
+            <a:extLst>
+              <a:ext uri="{FF2B5EF4-FFF2-40B4-BE49-F238E27FC236}">
+                <a16:creationId xmlns:a16="http://schemas.microsoft.com/office/drawing/2014/main" id="{B14E8936-A948-547A-DB13-A75737AB41A9}"/>
+              </a:ext>
+            </a:extLst>
+          </p:cNvPr>
+          <p:cNvSpPr/>
+          <p:nvPr/>
+        </p:nvSpPr>
+        <p:spPr>
+          <a:xfrm>
+            <a:off x="532010" y="2981026"/>
+            <a:ext cx="3041040" cy="479751"/>
+          </a:xfrm>
+          <a:prstGeom prst="rect">
+            <a:avLst/>
+          </a:prstGeom>
+          <a:noFill/>
+          <a:ln w="38100">
+            <a:solidFill>
+              <a:schemeClr val="tx1"/>
+            </a:solidFill>
+          </a:ln>
+        </p:spPr>
+        <p:style>
+          <a:lnRef idx="2">
+            <a:schemeClr val="accent1">
+              <a:shade val="15000"/>
+            </a:schemeClr>
+          </a:lnRef>
+          <a:fillRef idx="1">
+            <a:schemeClr val="accent1"/>
+          </a:fillRef>
+          <a:effectRef idx="0">
+            <a:schemeClr val="accent1"/>
+          </a:effectRef>
+          <a:fontRef idx="minor">
+            <a:schemeClr val="lt1"/>
+          </a:fontRef>
+        </p:style>
+        <p:txBody>
+          <a:bodyPr rtlCol="0" anchor="ctr"/>
+          <a:lstStyle/>
+          <a:p>
+            <a:pPr algn="ctr"/>
+            <a:endParaRPr lang="es-ES"/>
+          </a:p>
+        </p:txBody>
+      </p:sp>
+      <p:sp>
+        <p:nvSpPr>
+          <p:cNvPr id="7" name="Rectángulo 6">
+            <a:extLst>
+              <a:ext uri="{FF2B5EF4-FFF2-40B4-BE49-F238E27FC236}">
+                <a16:creationId xmlns:a16="http://schemas.microsoft.com/office/drawing/2014/main" id="{4763EB04-87F1-3F2B-4457-6CAA38F5B4F5}"/>
+              </a:ext>
+            </a:extLst>
+          </p:cNvPr>
+          <p:cNvSpPr/>
+          <p:nvPr/>
+        </p:nvSpPr>
+        <p:spPr>
+          <a:xfrm>
+            <a:off x="532010" y="3436976"/>
+            <a:ext cx="3041040" cy="479751"/>
+          </a:xfrm>
+          <a:prstGeom prst="rect">
+            <a:avLst/>
+          </a:prstGeom>
+          <a:noFill/>
+          <a:ln w="38100">
+            <a:solidFill>
+              <a:schemeClr val="tx1"/>
+            </a:solidFill>
+          </a:ln>
+        </p:spPr>
+        <p:style>
+          <a:lnRef idx="2">
+            <a:schemeClr val="accent1">
+              <a:shade val="15000"/>
+            </a:schemeClr>
+          </a:lnRef>
+          <a:fillRef idx="1">
+            <a:schemeClr val="accent1"/>
+          </a:fillRef>
+          <a:effectRef idx="0">
+            <a:schemeClr val="accent1"/>
+          </a:effectRef>
+          <a:fontRef idx="minor">
+            <a:schemeClr val="lt1"/>
+          </a:fontRef>
+        </p:style>
+        <p:txBody>
+          <a:bodyPr rtlCol="0" anchor="ctr"/>
+          <a:lstStyle/>
+          <a:p>
+            <a:pPr algn="ctr"/>
+            <a:endParaRPr lang="es-ES"/>
+          </a:p>
+        </p:txBody>
+      </p:sp>
+      <p:sp>
+        <p:nvSpPr>
+          <p:cNvPr id="9" name="Rectángulo 8">
+            <a:extLst>
+              <a:ext uri="{FF2B5EF4-FFF2-40B4-BE49-F238E27FC236}">
+                <a16:creationId xmlns:a16="http://schemas.microsoft.com/office/drawing/2014/main" id="{D417D3AA-6FB1-409E-7650-A400338053D8}"/>
+              </a:ext>
+            </a:extLst>
+          </p:cNvPr>
+          <p:cNvSpPr/>
+          <p:nvPr/>
+        </p:nvSpPr>
+        <p:spPr>
+          <a:xfrm>
+            <a:off x="532010" y="3916727"/>
+            <a:ext cx="3041040" cy="479751"/>
+          </a:xfrm>
+          <a:prstGeom prst="rect">
+            <a:avLst/>
+          </a:prstGeom>
+          <a:noFill/>
+          <a:ln w="38100">
+            <a:solidFill>
+              <a:schemeClr val="tx1"/>
+            </a:solidFill>
+          </a:ln>
+        </p:spPr>
+        <p:style>
+          <a:lnRef idx="2">
+            <a:schemeClr val="accent1">
+              <a:shade val="15000"/>
+            </a:schemeClr>
+          </a:lnRef>
+          <a:fillRef idx="1">
+            <a:schemeClr val="accent1"/>
+          </a:fillRef>
+          <a:effectRef idx="0">
+            <a:schemeClr val="accent1"/>
+          </a:effectRef>
+          <a:fontRef idx="minor">
+            <a:schemeClr val="lt1"/>
+          </a:fontRef>
+        </p:style>
+        <p:txBody>
+          <a:bodyPr rtlCol="0" anchor="ctr"/>
+          <a:lstStyle/>
+          <a:p>
+            <a:pPr algn="ctr"/>
+            <a:endParaRPr lang="es-ES"/>
+          </a:p>
+        </p:txBody>
+      </p:sp>
+      <p:sp>
+        <p:nvSpPr>
+          <p:cNvPr id="10" name="Rectángulo 9">
+            <a:extLst>
+              <a:ext uri="{FF2B5EF4-FFF2-40B4-BE49-F238E27FC236}">
+                <a16:creationId xmlns:a16="http://schemas.microsoft.com/office/drawing/2014/main" id="{7D5E29DD-3D3B-7805-4AD3-455A0DB16B5F}"/>
+              </a:ext>
+            </a:extLst>
+          </p:cNvPr>
+          <p:cNvSpPr/>
+          <p:nvPr/>
+        </p:nvSpPr>
+        <p:spPr>
+          <a:xfrm>
+            <a:off x="4105059" y="2062486"/>
+            <a:ext cx="4341659" cy="479751"/>
+          </a:xfrm>
+          <a:prstGeom prst="rect">
+            <a:avLst/>
+          </a:prstGeom>
+          <a:noFill/>
+          <a:ln w="38100">
+            <a:solidFill>
+              <a:schemeClr val="tx1"/>
+            </a:solidFill>
+          </a:ln>
+        </p:spPr>
+        <p:style>
+          <a:lnRef idx="2">
+            <a:schemeClr val="accent1">
+              <a:shade val="15000"/>
+            </a:schemeClr>
+          </a:lnRef>
+          <a:fillRef idx="1">
+            <a:schemeClr val="accent1"/>
+          </a:fillRef>
+          <a:effectRef idx="0">
+            <a:schemeClr val="accent1"/>
+          </a:effectRef>
+          <a:fontRef idx="minor">
+            <a:schemeClr val="lt1"/>
+          </a:fontRef>
+        </p:style>
+        <p:txBody>
+          <a:bodyPr rtlCol="0" anchor="ctr"/>
+          <a:lstStyle/>
+          <a:p>
+            <a:pPr algn="ctr"/>
+            <a:endParaRPr lang="es-ES"/>
+          </a:p>
+        </p:txBody>
+      </p:sp>
+      <p:sp>
+        <p:nvSpPr>
+          <p:cNvPr id="11" name="Rectángulo 10">
+            <a:extLst>
+              <a:ext uri="{FF2B5EF4-FFF2-40B4-BE49-F238E27FC236}">
+                <a16:creationId xmlns:a16="http://schemas.microsoft.com/office/drawing/2014/main" id="{F91B6D34-86A4-3555-11C0-78182CE84EA5}"/>
+              </a:ext>
+            </a:extLst>
+          </p:cNvPr>
+          <p:cNvSpPr/>
+          <p:nvPr/>
+        </p:nvSpPr>
+        <p:spPr>
+          <a:xfrm>
+            <a:off x="4105051" y="3905009"/>
+            <a:ext cx="4341659" cy="479751"/>
+          </a:xfrm>
+          <a:prstGeom prst="rect">
+            <a:avLst/>
+          </a:prstGeom>
+          <a:noFill/>
+          <a:ln w="38100">
+            <a:solidFill>
+              <a:schemeClr val="tx1"/>
+            </a:solidFill>
+          </a:ln>
+        </p:spPr>
+        <p:style>
+          <a:lnRef idx="2">
+            <a:schemeClr val="accent1">
+              <a:shade val="15000"/>
+            </a:schemeClr>
+          </a:lnRef>
+          <a:fillRef idx="1">
+            <a:schemeClr val="accent1"/>
+          </a:fillRef>
+          <a:effectRef idx="0">
+            <a:schemeClr val="accent1"/>
+          </a:effectRef>
+          <a:fontRef idx="minor">
+            <a:schemeClr val="lt1"/>
+          </a:fontRef>
+        </p:style>
+        <p:txBody>
+          <a:bodyPr rtlCol="0" anchor="ctr"/>
+          <a:lstStyle/>
+          <a:p>
+            <a:pPr algn="ctr"/>
+            <a:endParaRPr lang="es-ES"/>
+          </a:p>
+        </p:txBody>
+      </p:sp>
+      <p:sp>
+        <p:nvSpPr>
+          <p:cNvPr id="12" name="Rectángulo 11">
+            <a:extLst>
+              <a:ext uri="{FF2B5EF4-FFF2-40B4-BE49-F238E27FC236}">
+                <a16:creationId xmlns:a16="http://schemas.microsoft.com/office/drawing/2014/main" id="{6C44A43C-0039-97C8-8252-FAB9FD08B186}"/>
+              </a:ext>
+            </a:extLst>
+          </p:cNvPr>
+          <p:cNvSpPr/>
+          <p:nvPr/>
+        </p:nvSpPr>
+        <p:spPr>
+          <a:xfrm>
+            <a:off x="4105056" y="4359771"/>
+            <a:ext cx="4341659" cy="479751"/>
+          </a:xfrm>
+          <a:prstGeom prst="rect">
+            <a:avLst/>
+          </a:prstGeom>
+          <a:noFill/>
+          <a:ln w="38100">
+            <a:solidFill>
+              <a:schemeClr val="tx1"/>
+            </a:solidFill>
+          </a:ln>
+        </p:spPr>
+        <p:style>
+          <a:lnRef idx="2">
+            <a:schemeClr val="accent1">
+              <a:shade val="15000"/>
+            </a:schemeClr>
+          </a:lnRef>
+          <a:fillRef idx="1">
+            <a:schemeClr val="accent1"/>
+          </a:fillRef>
+          <a:effectRef idx="0">
+            <a:schemeClr val="accent1"/>
+          </a:effectRef>
+          <a:fontRef idx="minor">
+            <a:schemeClr val="lt1"/>
+          </a:fontRef>
+        </p:style>
+        <p:txBody>
+          <a:bodyPr rtlCol="0" anchor="ctr"/>
+          <a:lstStyle/>
+          <a:p>
+            <a:pPr algn="ctr"/>
+            <a:endParaRPr lang="es-ES"/>
+          </a:p>
+        </p:txBody>
+      </p:sp>
+    </p:spTree>
+    <p:extLst>
+      <p:ext uri="{BB962C8B-B14F-4D97-AF65-F5344CB8AC3E}">
+        <p14:creationId xmlns:p14="http://schemas.microsoft.com/office/powerpoint/2010/main" val="3971697560"/>
+      </p:ext>
+    </p:extLst>
+  </p:cSld>
+  <p:clrMapOvr>
+    <a:masterClrMapping/>
+  </p:clrMapOvr>
+  <p:timing>
+    <p:tnLst>
+      <p:par>
+        <p:cTn id="1" dur="indefinite" restart="never" nodeType="tmRoot">
+          <p:childTnLst>
+            <p:seq concurrent="1" nextAc="seek">
+              <p:cTn id="2" dur="indefinite" nodeType="mainSeq">
+                <p:childTnLst>
+                  <p:par>
+                    <p:cTn id="3" fill="hold">
+                      <p:stCondLst>
+                        <p:cond delay="indefinite"/>
+                      </p:stCondLst>
+                      <p:childTnLst>
+                        <p:par>
+                          <p:cTn id="4" fill="hold">
+                            <p:stCondLst>
+                              <p:cond delay="0"/>
+                            </p:stCondLst>
+                            <p:childTnLst>
+                              <p:par>
+                                <p:cTn id="5" presetID="1" presetClass="entr" presetSubtype="0" fill="hold" grpId="0" nodeType="clickEffect">
+                                  <p:stCondLst>
+                                    <p:cond delay="0"/>
+                                  </p:stCondLst>
+                                  <p:childTnLst>
+                                    <p:set>
+                                      <p:cBhvr>
+                                        <p:cTn id="6" dur="1" fill="hold">
+                                          <p:stCondLst>
+                                            <p:cond delay="0"/>
+                                          </p:stCondLst>
+                                        </p:cTn>
+                                        <p:tgtEl>
+                                          <p:spTgt spid="10"/>
+                                        </p:tgtEl>
+                                        <p:attrNameLst>
+                                          <p:attrName>style.visibility</p:attrName>
+                                        </p:attrNameLst>
+                                      </p:cBhvr>
+                                      <p:to>
+                                        <p:strVal val="visible"/>
+                                      </p:to>
+                                    </p:set>
+                                  </p:childTnLst>
+                                </p:cTn>
+                              </p:par>
+                              <p:par>
+                                <p:cTn id="7" presetID="1" presetClass="entr" presetSubtype="0" fill="hold" grpId="0" nodeType="withEffect">
+                                  <p:stCondLst>
+                                    <p:cond delay="0"/>
+                                  </p:stCondLst>
+                                  <p:childTnLst>
+                                    <p:set>
+                                      <p:cBhvr>
+                                        <p:cTn id="8" dur="1" fill="hold">
+                                          <p:stCondLst>
+                                            <p:cond delay="0"/>
+                                          </p:stCondLst>
+                                        </p:cTn>
+                                        <p:tgtEl>
+                                          <p:spTgt spid="7"/>
+                                        </p:tgtEl>
+                                        <p:attrNameLst>
+                                          <p:attrName>style.visibility</p:attrName>
+                                        </p:attrNameLst>
+                                      </p:cBhvr>
+                                      <p:to>
+                                        <p:strVal val="visible"/>
+                                      </p:to>
+                                    </p:set>
+                                  </p:childTnLst>
+                                </p:cTn>
+                              </p:par>
+                              <p:par>
+                                <p:cTn id="9" presetID="1" presetClass="entr" presetSubtype="0" fill="hold" grpId="0" nodeType="withEffect">
+                                  <p:stCondLst>
+                                    <p:cond delay="0"/>
+                                  </p:stCondLst>
+                                  <p:childTnLst>
+                                    <p:set>
+                                      <p:cBhvr>
+                                        <p:cTn id="10" dur="1" fill="hold">
+                                          <p:stCondLst>
+                                            <p:cond delay="0"/>
+                                          </p:stCondLst>
+                                        </p:cTn>
+                                        <p:tgtEl>
+                                          <p:spTgt spid="4"/>
+                                        </p:tgtEl>
+                                        <p:attrNameLst>
+                                          <p:attrName>style.visibility</p:attrName>
+                                        </p:attrNameLst>
+                                      </p:cBhvr>
+                                      <p:to>
+                                        <p:strVal val="visible"/>
+                                      </p:to>
+                                    </p:set>
+                                  </p:childTnLst>
+                                </p:cTn>
+                              </p:par>
+                              <p:par>
+                                <p:cTn id="11" presetID="1" presetClass="entr" presetSubtype="0" fill="hold" grpId="0" nodeType="withEffect">
+                                  <p:stCondLst>
+                                    <p:cond delay="0"/>
+                                  </p:stCondLst>
+                                  <p:childTnLst>
+                                    <p:set>
+                                      <p:cBhvr>
+                                        <p:cTn id="12" dur="1" fill="hold">
+                                          <p:stCondLst>
+                                            <p:cond delay="0"/>
+                                          </p:stCondLst>
+                                        </p:cTn>
+                                        <p:tgtEl>
+                                          <p:spTgt spid="9"/>
+                                        </p:tgtEl>
+                                        <p:attrNameLst>
+                                          <p:attrName>style.visibility</p:attrName>
+                                        </p:attrNameLst>
+                                      </p:cBhvr>
+                                      <p:to>
+                                        <p:strVal val="visible"/>
+                                      </p:to>
+                                    </p:set>
+                                  </p:childTnLst>
+                                </p:cTn>
+                              </p:par>
+                              <p:par>
+                                <p:cTn id="13" presetID="1" presetClass="entr" presetSubtype="0" fill="hold" grpId="0" nodeType="withEffect">
+                                  <p:stCondLst>
+                                    <p:cond delay="0"/>
+                                  </p:stCondLst>
+                                  <p:childTnLst>
+                                    <p:set>
+                                      <p:cBhvr>
+                                        <p:cTn id="14" dur="1" fill="hold">
+                                          <p:stCondLst>
+                                            <p:cond delay="0"/>
+                                          </p:stCondLst>
+                                        </p:cTn>
+                                        <p:tgtEl>
+                                          <p:spTgt spid="11"/>
+                                        </p:tgtEl>
+                                        <p:attrNameLst>
+                                          <p:attrName>style.visibility</p:attrName>
+                                        </p:attrNameLst>
+                                      </p:cBhvr>
+                                      <p:to>
+                                        <p:strVal val="visible"/>
+                                      </p:to>
+                                    </p:set>
+                                  </p:childTnLst>
+                                </p:cTn>
+                              </p:par>
+                              <p:par>
+                                <p:cTn id="15" presetID="1" presetClass="entr" presetSubtype="0" fill="hold" grpId="0" nodeType="withEffect">
+                                  <p:stCondLst>
+                                    <p:cond delay="0"/>
+                                  </p:stCondLst>
+                                  <p:childTnLst>
+                                    <p:set>
+                                      <p:cBhvr>
+                                        <p:cTn id="16" dur="1" fill="hold">
+                                          <p:stCondLst>
+                                            <p:cond delay="0"/>
+                                          </p:stCondLst>
+                                        </p:cTn>
+                                        <p:tgtEl>
+                                          <p:spTgt spid="12"/>
+                                        </p:tgtEl>
+                                        <p:attrNameLst>
+                                          <p:attrName>style.visibility</p:attrName>
+                                        </p:attrNameLst>
+                                      </p:cBhvr>
+                                      <p:to>
+                                        <p:strVal val="visible"/>
+                                      </p:to>
+                                    </p:set>
+                                  </p:childTnLst>
+                                </p:cTn>
+                              </p:par>
+                            </p:childTnLst>
+                          </p:cTn>
+                        </p:par>
+                      </p:childTnLst>
+                    </p:cTn>
+                  </p:par>
+                </p:childTnLst>
+              </p:cTn>
+              <p:prevCondLst>
+                <p:cond evt="onPrev" delay="0">
+                  <p:tgtEl>
+                    <p:sldTgt/>
+                  </p:tgtEl>
+                </p:cond>
+              </p:prevCondLst>
+              <p:nextCondLst>
+                <p:cond evt="onNext" delay="0">
+                  <p:tgtEl>
+                    <p:sldTgt/>
+                  </p:tgtEl>
+                </p:cond>
+              </p:nextCondLst>
+            </p:seq>
+          </p:childTnLst>
+        </p:cTn>
+      </p:par>
+    </p:tnLst>
+    <p:bldLst>
+      <p:bldP spid="4" grpId="0" animBg="1"/>
+      <p:bldP spid="7" grpId="0" animBg="1"/>
+      <p:bldP spid="9" grpId="0" animBg="1"/>
+      <p:bldP spid="10" grpId="0" animBg="1"/>
+      <p:bldP spid="11" grpId="0" animBg="1"/>
+      <p:bldP spid="12" grpId="0" animBg="1"/>
     </p:bldLst>
   </p:timing>
 </p:sld>

</xml_diff>